<commit_message>
Review textual básico do pptx
não precisou alterar quase nada
</commit_message>
<xml_diff>
--- a/Apresentação Git e GitHub.pptx
+++ b/Apresentação Git e GitHub.pptx
@@ -120,7 +120,7 @@
   </p:defaultTextStyle>
   <p:extLst>
     <p:ext uri="{EFAFB233-063F-42B5-8137-9DF3F51BA10A}">
-      <p15:sldGuideLst xmlns:p15="http://schemas.microsoft.com/office/powerpoint/2012/main">
+      <p15:sldGuideLst xmlns="" xmlns:p15="http://schemas.microsoft.com/office/powerpoint/2012/main">
         <p15:guide id="1" orient="horz" pos="2160">
           <p15:clr>
             <a:srgbClr val="A4A3A4"/>
@@ -1153,10 +1153,8 @@
         <a:p>
           <a:pPr rtl="0"/>
           <a:r>
-            <a:rPr lang="pt-BR" dirty="0">
-              <a:latin typeface="Calibri"/>
-            </a:rPr>
-            <a:t>GitHub/Gitlab</a:t>
+            <a:rPr lang="pt-BR" dirty="0" err="1" smtClean="0"/>
+            <a:t>Gist</a:t>
           </a:r>
           <a:endParaRPr lang="pt-BR" dirty="0"/>
         </a:p>
@@ -1199,21 +1197,50 @@
         <a:lstStyle/>
         <a:p>
           <a:r>
-            <a:rPr lang="pt-BR" dirty="0">
+            <a:rPr lang="pt-BR" dirty="0" err="1" smtClean="0">
               <a:latin typeface="Calibri"/>
             </a:rPr>
-            <a:t>Gist</a:t>
+            <a:t>GitHub</a:t>
           </a:r>
+          <a:r>
+            <a:rPr lang="pt-BR" dirty="0" smtClean="0">
+              <a:latin typeface="Calibri"/>
+            </a:rPr>
+            <a:t>/</a:t>
+          </a:r>
+          <a:r>
+            <a:rPr lang="pt-BR" dirty="0" err="1" smtClean="0">
+              <a:latin typeface="Calibri"/>
+            </a:rPr>
+            <a:t>Gitlab</a:t>
+          </a:r>
+          <a:endParaRPr lang="pt-BR" dirty="0">
+            <a:latin typeface="Calibri"/>
+          </a:endParaRPr>
         </a:p>
       </dgm:t>
     </dgm:pt>
     <dgm:pt modelId="{F0313CB9-513F-4994-A0FD-DCF526132E36}" type="parTrans" cxnId="{B0B75A0C-52F6-4C60-84B4-B8D0ED086D07}">
       <dgm:prSet/>
       <dgm:spPr/>
+      <dgm:t>
+        <a:bodyPr/>
+        <a:lstStyle/>
+        <a:p>
+          <a:endParaRPr lang="pt-BR"/>
+        </a:p>
+      </dgm:t>
     </dgm:pt>
     <dgm:pt modelId="{5CA158C6-AAC0-46F4-83A1-350A9557FE65}" type="sibTrans" cxnId="{B0B75A0C-52F6-4C60-84B4-B8D0ED086D07}">
       <dgm:prSet/>
       <dgm:spPr/>
+      <dgm:t>
+        <a:bodyPr/>
+        <a:lstStyle/>
+        <a:p>
+          <a:endParaRPr lang="pt-BR"/>
+        </a:p>
+      </dgm:t>
     </dgm:pt>
     <dgm:pt modelId="{A02C6BCC-5E7D-4DFB-83BD-7EC340E5DF16}">
       <dgm:prSet phldr="0"/>
@@ -1235,10 +1262,24 @@
     <dgm:pt modelId="{C9E019D8-983B-428D-AFEE-AED40B1C8789}" type="parTrans" cxnId="{DBA9E36B-98E9-43C1-B440-2A63551DA12D}">
       <dgm:prSet/>
       <dgm:spPr/>
+      <dgm:t>
+        <a:bodyPr/>
+        <a:lstStyle/>
+        <a:p>
+          <a:endParaRPr lang="pt-BR"/>
+        </a:p>
+      </dgm:t>
     </dgm:pt>
     <dgm:pt modelId="{41E5EC1F-F77E-4C44-9DBB-3B73D1F11B12}" type="sibTrans" cxnId="{DBA9E36B-98E9-43C1-B440-2A63551DA12D}">
       <dgm:prSet/>
       <dgm:spPr/>
+      <dgm:t>
+        <a:bodyPr/>
+        <a:lstStyle/>
+        <a:p>
+          <a:endParaRPr lang="pt-BR"/>
+        </a:p>
+      </dgm:t>
     </dgm:pt>
     <dgm:pt modelId="{6D3BD8D8-350F-477B-BF2D-D181A8F2A288}" type="pres">
       <dgm:prSet presAssocID="{A7A76651-1E29-4399-9E7A-EB8FFF46FECF}" presName="Name0" presStyleCnt="0">
@@ -1249,6 +1290,13 @@
         </dgm:presLayoutVars>
       </dgm:prSet>
       <dgm:spPr/>
+      <dgm:t>
+        <a:bodyPr/>
+        <a:lstStyle/>
+        <a:p>
+          <a:endParaRPr lang="pt-BR"/>
+        </a:p>
+      </dgm:t>
     </dgm:pt>
     <dgm:pt modelId="{46B5FEBA-D78A-4ABE-9897-ECF47FDB0BCF}" type="pres">
       <dgm:prSet presAssocID="{FF46E3B0-D854-44EF-9B89-5B7F7599DD66}" presName="linNode" presStyleCnt="0"/>
@@ -1262,6 +1310,13 @@
         </dgm:presLayoutVars>
       </dgm:prSet>
       <dgm:spPr/>
+      <dgm:t>
+        <a:bodyPr/>
+        <a:lstStyle/>
+        <a:p>
+          <a:endParaRPr lang="pt-BR"/>
+        </a:p>
+      </dgm:t>
     </dgm:pt>
     <dgm:pt modelId="{D4531ACA-C479-4E80-A9A1-DDED8D2C09E6}" type="pres">
       <dgm:prSet presAssocID="{47FC7073-E6BA-43E2-B6DB-BEA0B57BDF26}" presName="sp" presStyleCnt="0"/>
@@ -1279,6 +1334,13 @@
         </dgm:presLayoutVars>
       </dgm:prSet>
       <dgm:spPr/>
+      <dgm:t>
+        <a:bodyPr/>
+        <a:lstStyle/>
+        <a:p>
+          <a:endParaRPr lang="pt-BR"/>
+        </a:p>
+      </dgm:t>
     </dgm:pt>
     <dgm:pt modelId="{D8BD57A6-D0CF-4AE7-855B-393D1547EB08}" type="pres">
       <dgm:prSet presAssocID="{13AE7267-0BB3-4EC0-B1F6-119C57D7EF16}" presName="sp" presStyleCnt="0"/>
@@ -1296,6 +1358,13 @@
         </dgm:presLayoutVars>
       </dgm:prSet>
       <dgm:spPr/>
+      <dgm:t>
+        <a:bodyPr/>
+        <a:lstStyle/>
+        <a:p>
+          <a:endParaRPr lang="pt-BR"/>
+        </a:p>
+      </dgm:t>
     </dgm:pt>
     <dgm:pt modelId="{4DBDAC1C-722A-4C41-AE7B-AB1D8B36EC26}" type="pres">
       <dgm:prSet presAssocID="{031875E3-DDE8-47CD-8B19-75E8CCB37934}" presName="sp" presStyleCnt="0"/>
@@ -1313,6 +1382,13 @@
         </dgm:presLayoutVars>
       </dgm:prSet>
       <dgm:spPr/>
+      <dgm:t>
+        <a:bodyPr/>
+        <a:lstStyle/>
+        <a:p>
+          <a:endParaRPr lang="pt-BR"/>
+        </a:p>
+      </dgm:t>
     </dgm:pt>
     <dgm:pt modelId="{49964973-1F50-483E-AECA-27B454644BA5}" type="pres">
       <dgm:prSet presAssocID="{B56ED847-D406-4318-906D-5437F79453BF}" presName="sp" presStyleCnt="0"/>
@@ -1330,6 +1406,13 @@
         </dgm:presLayoutVars>
       </dgm:prSet>
       <dgm:spPr/>
+      <dgm:t>
+        <a:bodyPr/>
+        <a:lstStyle/>
+        <a:p>
+          <a:endParaRPr lang="pt-BR"/>
+        </a:p>
+      </dgm:t>
     </dgm:pt>
     <dgm:pt modelId="{D33622C0-E0C8-4EF1-B839-90075E9C85C3}" type="pres">
       <dgm:prSet presAssocID="{6C56D952-B6EF-44DC-B398-D72D61A613FD}" presName="sp" presStyleCnt="0"/>
@@ -1347,6 +1430,13 @@
         </dgm:presLayoutVars>
       </dgm:prSet>
       <dgm:spPr/>
+      <dgm:t>
+        <a:bodyPr/>
+        <a:lstStyle/>
+        <a:p>
+          <a:endParaRPr lang="pt-BR"/>
+        </a:p>
+      </dgm:t>
     </dgm:pt>
     <dgm:pt modelId="{60134E8E-CC54-456C-A79D-276D621CB179}" type="pres">
       <dgm:prSet presAssocID="{41E5EC1F-F77E-4C44-9DBB-3B73D1F11B12}" presName="sp" presStyleCnt="0"/>
@@ -1364,6 +1454,13 @@
         </dgm:presLayoutVars>
       </dgm:prSet>
       <dgm:spPr/>
+      <dgm:t>
+        <a:bodyPr/>
+        <a:lstStyle/>
+        <a:p>
+          <a:endParaRPr lang="pt-BR"/>
+        </a:p>
+      </dgm:t>
     </dgm:pt>
     <dgm:pt modelId="{C6803B66-5C5C-4B2C-B83A-6D7AB4039CF9}" type="pres">
       <dgm:prSet presAssocID="{EF2DC74D-A016-4C6F-875E-FA8FE977957A}" presName="sp" presStyleCnt="0"/>
@@ -1381,26 +1478,33 @@
         </dgm:presLayoutVars>
       </dgm:prSet>
       <dgm:spPr/>
+      <dgm:t>
+        <a:bodyPr/>
+        <a:lstStyle/>
+        <a:p>
+          <a:endParaRPr lang="pt-BR"/>
+        </a:p>
+      </dgm:t>
     </dgm:pt>
   </dgm:ptLst>
   <dgm:cxnLst>
+    <dgm:cxn modelId="{EC8D2956-DFDC-4C7C-BE56-AEA92DFE163D}" srcId="{A7A76651-1E29-4399-9E7A-EB8FFF46FECF}" destId="{CEB6DC8F-14A4-4307-8D1E-0D945FF386DE}" srcOrd="1" destOrd="0" parTransId="{FAD2A73B-A3F9-4092-9DF4-0AADB5880E4B}" sibTransId="{13AE7267-0BB3-4EC0-B1F6-119C57D7EF16}"/>
+    <dgm:cxn modelId="{50A1B2F4-925D-4E1A-89E3-E0B4B79DFF36}" srcId="{A7A76651-1E29-4399-9E7A-EB8FFF46FECF}" destId="{9EDAFAE1-E7B6-4567-A002-4685F2FEC7B4}" srcOrd="6" destOrd="0" parTransId="{D8CBD1C0-F696-45F5-9046-150B334A7632}" sibTransId="{EF2DC74D-A016-4C6F-875E-FA8FE977957A}"/>
+    <dgm:cxn modelId="{DDC7E79D-CEEE-4080-BE3D-3C65D2CD5E65}" type="presOf" srcId="{FF46E3B0-D854-44EF-9B89-5B7F7599DD66}" destId="{1E89AA9A-AB19-43DE-AFE2-C465C6EF9C7B}" srcOrd="0" destOrd="0" presId="urn:microsoft.com/office/officeart/2005/8/layout/vList5"/>
+    <dgm:cxn modelId="{C374A072-6EF2-4E6D-A5F5-52CD673E3CC2}" srcId="{A7A76651-1E29-4399-9E7A-EB8FFF46FECF}" destId="{FF46E3B0-D854-44EF-9B89-5B7F7599DD66}" srcOrd="0" destOrd="0" parTransId="{6D719CE8-701F-49B3-B143-E8DC11DD6C8A}" sibTransId="{47FC7073-E6BA-43E2-B6DB-BEA0B57BDF26}"/>
+    <dgm:cxn modelId="{52E23AB7-C9C9-46B1-A10C-2440E0E10188}" type="presOf" srcId="{A02C6BCC-5E7D-4DFB-83BD-7EC340E5DF16}" destId="{C0D550F5-6370-4B0E-9175-90CCBDD7B7B6}" srcOrd="0" destOrd="0" presId="urn:microsoft.com/office/officeart/2005/8/layout/vList5"/>
+    <dgm:cxn modelId="{82912461-42E3-45AF-B8BE-0D33FFD76082}" type="presOf" srcId="{CEB6DC8F-14A4-4307-8D1E-0D945FF386DE}" destId="{923ABF9A-A118-48CD-843B-66341282BD01}" srcOrd="0" destOrd="0" presId="urn:microsoft.com/office/officeart/2005/8/layout/vList5"/>
+    <dgm:cxn modelId="{22F6DE24-CAEF-40F0-970D-46DFEE6DD0F9}" type="presOf" srcId="{5CBB0119-3D19-45D5-85C2-86F11E059556}" destId="{326CBF78-FE94-4B84-8CB6-55CEC278AE1B}" srcOrd="0" destOrd="0" presId="urn:microsoft.com/office/officeart/2005/8/layout/vList5"/>
+    <dgm:cxn modelId="{7FD1B5C1-5050-4EA7-9991-CD85E4852DFC}" type="presOf" srcId="{F98A87D9-4339-4420-82B8-063587BF0D17}" destId="{65BDE778-F5E4-4AD0-AAF5-F3AB2819A29C}" srcOrd="0" destOrd="0" presId="urn:microsoft.com/office/officeart/2005/8/layout/vList5"/>
+    <dgm:cxn modelId="{DBA9E36B-98E9-43C1-B440-2A63551DA12D}" srcId="{A7A76651-1E29-4399-9E7A-EB8FFF46FECF}" destId="{A02C6BCC-5E7D-4DFB-83BD-7EC340E5DF16}" srcOrd="5" destOrd="0" parTransId="{C9E019D8-983B-428D-AFEE-AED40B1C8789}" sibTransId="{41E5EC1F-F77E-4C44-9DBB-3B73D1F11B12}"/>
+    <dgm:cxn modelId="{CF0488C9-24FF-49DB-987F-DD5C524A724C}" type="presOf" srcId="{A7A76651-1E29-4399-9E7A-EB8FFF46FECF}" destId="{6D3BD8D8-350F-477B-BF2D-D181A8F2A288}" srcOrd="0" destOrd="0" presId="urn:microsoft.com/office/officeart/2005/8/layout/vList5"/>
+    <dgm:cxn modelId="{01D4237F-3BEE-49D6-A0D2-00F295C12A72}" srcId="{A7A76651-1E29-4399-9E7A-EB8FFF46FECF}" destId="{F98A87D9-4339-4420-82B8-063587BF0D17}" srcOrd="3" destOrd="0" parTransId="{358C3B01-09C0-4DF2-A723-E0236A6FF075}" sibTransId="{B56ED847-D406-4318-906D-5437F79453BF}"/>
+    <dgm:cxn modelId="{F71DC829-0339-4405-B82A-041CDAF132EA}" srcId="{A7A76651-1E29-4399-9E7A-EB8FFF46FECF}" destId="{63FA67B8-4F9E-4588-94DE-DCF006AA8A73}" srcOrd="2" destOrd="0" parTransId="{CF7260E8-F1E7-4FAA-80E7-02A52AC762C7}" sibTransId="{031875E3-DDE8-47CD-8B19-75E8CCB37934}"/>
     <dgm:cxn modelId="{B0B75A0C-52F6-4C60-84B4-B8D0ED086D07}" srcId="{A7A76651-1E29-4399-9E7A-EB8FFF46FECF}" destId="{5CBB0119-3D19-45D5-85C2-86F11E059556}" srcOrd="7" destOrd="0" parTransId="{F0313CB9-513F-4994-A0FD-DCF526132E36}" sibTransId="{5CA158C6-AAC0-46F4-83A1-350A9557FE65}"/>
+    <dgm:cxn modelId="{D8A5F189-203C-49AA-9983-48759255FD65}" type="presOf" srcId="{63FA67B8-4F9E-4588-94DE-DCF006AA8A73}" destId="{AB9B8A1D-CE60-4F24-8BD9-BDC70A5EDE59}" srcOrd="0" destOrd="0" presId="urn:microsoft.com/office/officeart/2005/8/layout/vList5"/>
+    <dgm:cxn modelId="{AF5A1C3E-62F8-4212-A4D8-D796C3F75DEE}" srcId="{A7A76651-1E29-4399-9E7A-EB8FFF46FECF}" destId="{32CF76CD-390E-465D-9DF7-3F836C443626}" srcOrd="4" destOrd="0" parTransId="{568F1D14-BBF4-4E84-9AE8-64B555AD783D}" sibTransId="{6C56D952-B6EF-44DC-B398-D72D61A613FD}"/>
+    <dgm:cxn modelId="{B958335A-6EB5-4BA2-81E4-8E024373CA62}" type="presOf" srcId="{9EDAFAE1-E7B6-4567-A002-4685F2FEC7B4}" destId="{6771AC53-4A83-4325-B86C-62F6998C98CF}" srcOrd="0" destOrd="0" presId="urn:microsoft.com/office/officeart/2005/8/layout/vList5"/>
     <dgm:cxn modelId="{132F0B10-17A1-4E3F-9543-61C5D7E141A4}" type="presOf" srcId="{32CF76CD-390E-465D-9DF7-3F836C443626}" destId="{4C16C0B3-A735-4312-8EA8-1859E7743E4A}" srcOrd="0" destOrd="0" presId="urn:microsoft.com/office/officeart/2005/8/layout/vList5"/>
-    <dgm:cxn modelId="{22F6DE24-CAEF-40F0-970D-46DFEE6DD0F9}" type="presOf" srcId="{5CBB0119-3D19-45D5-85C2-86F11E059556}" destId="{326CBF78-FE94-4B84-8CB6-55CEC278AE1B}" srcOrd="0" destOrd="0" presId="urn:microsoft.com/office/officeart/2005/8/layout/vList5"/>
-    <dgm:cxn modelId="{F71DC829-0339-4405-B82A-041CDAF132EA}" srcId="{A7A76651-1E29-4399-9E7A-EB8FFF46FECF}" destId="{63FA67B8-4F9E-4588-94DE-DCF006AA8A73}" srcOrd="2" destOrd="0" parTransId="{CF7260E8-F1E7-4FAA-80E7-02A52AC762C7}" sibTransId="{031875E3-DDE8-47CD-8B19-75E8CCB37934}"/>
-    <dgm:cxn modelId="{AF5A1C3E-62F8-4212-A4D8-D796C3F75DEE}" srcId="{A7A76651-1E29-4399-9E7A-EB8FFF46FECF}" destId="{32CF76CD-390E-465D-9DF7-3F836C443626}" srcOrd="4" destOrd="0" parTransId="{568F1D14-BBF4-4E84-9AE8-64B555AD783D}" sibTransId="{6C56D952-B6EF-44DC-B398-D72D61A613FD}"/>
-    <dgm:cxn modelId="{82912461-42E3-45AF-B8BE-0D33FFD76082}" type="presOf" srcId="{CEB6DC8F-14A4-4307-8D1E-0D945FF386DE}" destId="{923ABF9A-A118-48CD-843B-66341282BD01}" srcOrd="0" destOrd="0" presId="urn:microsoft.com/office/officeart/2005/8/layout/vList5"/>
-    <dgm:cxn modelId="{DBA9E36B-98E9-43C1-B440-2A63551DA12D}" srcId="{A7A76651-1E29-4399-9E7A-EB8FFF46FECF}" destId="{A02C6BCC-5E7D-4DFB-83BD-7EC340E5DF16}" srcOrd="5" destOrd="0" parTransId="{C9E019D8-983B-428D-AFEE-AED40B1C8789}" sibTransId="{41E5EC1F-F77E-4C44-9DBB-3B73D1F11B12}"/>
-    <dgm:cxn modelId="{C374A072-6EF2-4E6D-A5F5-52CD673E3CC2}" srcId="{A7A76651-1E29-4399-9E7A-EB8FFF46FECF}" destId="{FF46E3B0-D854-44EF-9B89-5B7F7599DD66}" srcOrd="0" destOrd="0" parTransId="{6D719CE8-701F-49B3-B143-E8DC11DD6C8A}" sibTransId="{47FC7073-E6BA-43E2-B6DB-BEA0B57BDF26}"/>
-    <dgm:cxn modelId="{EC8D2956-DFDC-4C7C-BE56-AEA92DFE163D}" srcId="{A7A76651-1E29-4399-9E7A-EB8FFF46FECF}" destId="{CEB6DC8F-14A4-4307-8D1E-0D945FF386DE}" srcOrd="1" destOrd="0" parTransId="{FAD2A73B-A3F9-4092-9DF4-0AADB5880E4B}" sibTransId="{13AE7267-0BB3-4EC0-B1F6-119C57D7EF16}"/>
-    <dgm:cxn modelId="{B958335A-6EB5-4BA2-81E4-8E024373CA62}" type="presOf" srcId="{9EDAFAE1-E7B6-4567-A002-4685F2FEC7B4}" destId="{6771AC53-4A83-4325-B86C-62F6998C98CF}" srcOrd="0" destOrd="0" presId="urn:microsoft.com/office/officeart/2005/8/layout/vList5"/>
-    <dgm:cxn modelId="{01D4237F-3BEE-49D6-A0D2-00F295C12A72}" srcId="{A7A76651-1E29-4399-9E7A-EB8FFF46FECF}" destId="{F98A87D9-4339-4420-82B8-063587BF0D17}" srcOrd="3" destOrd="0" parTransId="{358C3B01-09C0-4DF2-A723-E0236A6FF075}" sibTransId="{B56ED847-D406-4318-906D-5437F79453BF}"/>
-    <dgm:cxn modelId="{D8A5F189-203C-49AA-9983-48759255FD65}" type="presOf" srcId="{63FA67B8-4F9E-4588-94DE-DCF006AA8A73}" destId="{AB9B8A1D-CE60-4F24-8BD9-BDC70A5EDE59}" srcOrd="0" destOrd="0" presId="urn:microsoft.com/office/officeart/2005/8/layout/vList5"/>
-    <dgm:cxn modelId="{DDC7E79D-CEEE-4080-BE3D-3C65D2CD5E65}" type="presOf" srcId="{FF46E3B0-D854-44EF-9B89-5B7F7599DD66}" destId="{1E89AA9A-AB19-43DE-AFE2-C465C6EF9C7B}" srcOrd="0" destOrd="0" presId="urn:microsoft.com/office/officeart/2005/8/layout/vList5"/>
-    <dgm:cxn modelId="{52E23AB7-C9C9-46B1-A10C-2440E0E10188}" type="presOf" srcId="{A02C6BCC-5E7D-4DFB-83BD-7EC340E5DF16}" destId="{C0D550F5-6370-4B0E-9175-90CCBDD7B7B6}" srcOrd="0" destOrd="0" presId="urn:microsoft.com/office/officeart/2005/8/layout/vList5"/>
-    <dgm:cxn modelId="{7FD1B5C1-5050-4EA7-9991-CD85E4852DFC}" type="presOf" srcId="{F98A87D9-4339-4420-82B8-063587BF0D17}" destId="{65BDE778-F5E4-4AD0-AAF5-F3AB2819A29C}" srcOrd="0" destOrd="0" presId="urn:microsoft.com/office/officeart/2005/8/layout/vList5"/>
-    <dgm:cxn modelId="{CF0488C9-24FF-49DB-987F-DD5C524A724C}" type="presOf" srcId="{A7A76651-1E29-4399-9E7A-EB8FFF46FECF}" destId="{6D3BD8D8-350F-477B-BF2D-D181A8F2A288}" srcOrd="0" destOrd="0" presId="urn:microsoft.com/office/officeart/2005/8/layout/vList5"/>
-    <dgm:cxn modelId="{50A1B2F4-925D-4E1A-89E3-E0B4B79DFF36}" srcId="{A7A76651-1E29-4399-9E7A-EB8FFF46FECF}" destId="{9EDAFAE1-E7B6-4567-A002-4685F2FEC7B4}" srcOrd="6" destOrd="0" parTransId="{D8CBD1C0-F696-45F5-9046-150B334A7632}" sibTransId="{EF2DC74D-A016-4C6F-875E-FA8FE977957A}"/>
     <dgm:cxn modelId="{DDAC6A3F-F575-4B73-A5D4-CB01C9EC68CD}" type="presParOf" srcId="{6D3BD8D8-350F-477B-BF2D-D181A8F2A288}" destId="{46B5FEBA-D78A-4ABE-9897-ECF47FDB0BCF}" srcOrd="0" destOrd="0" presId="urn:microsoft.com/office/officeart/2005/8/layout/vList5"/>
     <dgm:cxn modelId="{FEAD1BEC-7985-47B7-827C-A16F6203E2B3}" type="presParOf" srcId="{46B5FEBA-D78A-4ABE-9897-ECF47FDB0BCF}" destId="{1E89AA9A-AB19-43DE-AFE2-C465C6EF9C7B}" srcOrd="0" destOrd="0" presId="urn:microsoft.com/office/officeart/2005/8/layout/vList5"/>
     <dgm:cxn modelId="{38E7EEAB-3A92-47FC-A168-3C4E101086ED}" type="presParOf" srcId="{6D3BD8D8-350F-477B-BF2D-D181A8F2A288}" destId="{D4531ACA-C479-4E80-A9A1-DDED8D2C09E6}" srcOrd="1" destOrd="0" presId="urn:microsoft.com/office/officeart/2005/8/layout/vList5"/>
@@ -1429,7 +1533,7 @@
   <dgm:whole/>
   <dgm:extLst>
     <a:ext uri="http://schemas.microsoft.com/office/drawing/2008/diagram">
-      <dsp:dataModelExt xmlns:dsp="http://schemas.microsoft.com/office/drawing/2008/diagram" relId="rId6" minVer="http://schemas.openxmlformats.org/drawingml/2006/diagram"/>
+      <dsp:dataModelExt xmlns:dsp="http://schemas.microsoft.com/office/drawing/2008/diagram" relId="rId7" minVer="http://schemas.openxmlformats.org/drawingml/2006/diagram"/>
     </a:ext>
   </dgm:extLst>
 </dgm:dataModel>
@@ -1497,7 +1601,7 @@
         </a:bodyPr>
         <a:lstStyle/>
         <a:p>
-          <a:pPr marL="0" lvl="0" indent="0" algn="ctr" defTabSz="1200150" rtl="0">
+          <a:pPr lvl="0" algn="ctr" defTabSz="1200150" rtl="0">
             <a:lnSpc>
               <a:spcPct val="90000"/>
             </a:lnSpc>
@@ -1507,7 +1611,6 @@
             <a:spcAft>
               <a:spcPct val="35000"/>
             </a:spcAft>
-            <a:buNone/>
           </a:pPr>
           <a:r>
             <a:rPr lang="pt-BR" sz="2700" kern="1200" dirty="0"/>
@@ -1581,7 +1684,7 @@
         </a:bodyPr>
         <a:lstStyle/>
         <a:p>
-          <a:pPr marL="0" lvl="0" indent="0" algn="ctr" defTabSz="1200150" rtl="0">
+          <a:pPr lvl="0" algn="ctr" defTabSz="1200150" rtl="0">
             <a:lnSpc>
               <a:spcPct val="90000"/>
             </a:lnSpc>
@@ -1591,7 +1694,6 @@
             <a:spcAft>
               <a:spcPct val="35000"/>
             </a:spcAft>
-            <a:buNone/>
           </a:pPr>
           <a:r>
             <a:rPr lang="pt-BR" sz="2700" kern="1200" dirty="0"/>
@@ -1665,7 +1767,7 @@
         </a:bodyPr>
         <a:lstStyle/>
         <a:p>
-          <a:pPr marL="0" lvl="0" indent="0" algn="ctr" defTabSz="1200150" rtl="0">
+          <a:pPr lvl="0" algn="ctr" defTabSz="1200150" rtl="0">
             <a:lnSpc>
               <a:spcPct val="90000"/>
             </a:lnSpc>
@@ -1675,7 +1777,6 @@
             <a:spcAft>
               <a:spcPct val="35000"/>
             </a:spcAft>
-            <a:buNone/>
           </a:pPr>
           <a:r>
             <a:rPr lang="pt-BR" sz="2700" kern="1200" dirty="0"/>
@@ -1742,7 +1843,7 @@
         </a:bodyPr>
         <a:lstStyle/>
         <a:p>
-          <a:pPr marL="0" lvl="0" indent="0" algn="ctr" defTabSz="1200150" rtl="0">
+          <a:pPr lvl="0" algn="ctr" defTabSz="1200150" rtl="0">
             <a:lnSpc>
               <a:spcPct val="90000"/>
             </a:lnSpc>
@@ -1752,7 +1853,6 @@
             <a:spcAft>
               <a:spcPct val="35000"/>
             </a:spcAft>
-            <a:buNone/>
           </a:pPr>
           <a:r>
             <a:rPr lang="pt-BR" sz="2700" kern="1200" dirty="0"/>
@@ -1819,7 +1919,7 @@
         </a:bodyPr>
         <a:lstStyle/>
         <a:p>
-          <a:pPr marL="0" lvl="0" indent="0" algn="ctr" defTabSz="1200150" rtl="0">
+          <a:pPr lvl="0" algn="ctr" defTabSz="1200150" rtl="0">
             <a:lnSpc>
               <a:spcPct val="90000"/>
             </a:lnSpc>
@@ -1829,7 +1929,6 @@
             <a:spcAft>
               <a:spcPct val="35000"/>
             </a:spcAft>
-            <a:buNone/>
           </a:pPr>
           <a:r>
             <a:rPr lang="pt-BR" sz="2700" kern="1200" dirty="0">
@@ -1899,7 +1998,7 @@
         </a:bodyPr>
         <a:lstStyle/>
         <a:p>
-          <a:pPr marL="0" lvl="0" indent="0" algn="ctr" defTabSz="1200150" rtl="0">
+          <a:pPr lvl="0" algn="ctr" defTabSz="1200150" rtl="0">
             <a:lnSpc>
               <a:spcPct val="90000"/>
             </a:lnSpc>
@@ -1909,7 +2008,6 @@
             <a:spcAft>
               <a:spcPct val="35000"/>
             </a:spcAft>
-            <a:buNone/>
           </a:pPr>
           <a:r>
             <a:rPr lang="pt-BR" sz="2700" kern="1200" dirty="0">
@@ -1978,7 +2076,7 @@
         </a:bodyPr>
         <a:lstStyle/>
         <a:p>
-          <a:pPr marL="0" lvl="0" indent="0" algn="ctr" defTabSz="1200150" rtl="0">
+          <a:pPr lvl="0" algn="ctr" defTabSz="1200150" rtl="0">
             <a:lnSpc>
               <a:spcPct val="90000"/>
             </a:lnSpc>
@@ -1988,13 +2086,10 @@
             <a:spcAft>
               <a:spcPct val="35000"/>
             </a:spcAft>
-            <a:buNone/>
           </a:pPr>
           <a:r>
-            <a:rPr lang="pt-BR" sz="2700" kern="1200" dirty="0">
-              <a:latin typeface="Calibri"/>
-            </a:rPr>
-            <a:t>GitHub/Gitlab</a:t>
+            <a:rPr lang="pt-BR" sz="2700" kern="1200" dirty="0" err="1" smtClean="0"/>
+            <a:t>Gist</a:t>
           </a:r>
           <a:endParaRPr lang="pt-BR" sz="2700" kern="1200" dirty="0"/>
         </a:p>
@@ -2058,7 +2153,7 @@
         </a:bodyPr>
         <a:lstStyle/>
         <a:p>
-          <a:pPr marL="0" lvl="0" indent="0" algn="ctr" defTabSz="1200150">
+          <a:pPr lvl="0" algn="ctr" defTabSz="1200150">
             <a:lnSpc>
               <a:spcPct val="90000"/>
             </a:lnSpc>
@@ -2068,14 +2163,28 @@
             <a:spcAft>
               <a:spcPct val="35000"/>
             </a:spcAft>
-            <a:buNone/>
           </a:pPr>
           <a:r>
-            <a:rPr lang="pt-BR" sz="2700" kern="1200" dirty="0">
+            <a:rPr lang="pt-BR" sz="2700" kern="1200" dirty="0" err="1" smtClean="0">
               <a:latin typeface="Calibri"/>
             </a:rPr>
-            <a:t>Gist</a:t>
+            <a:t>GitHub</a:t>
           </a:r>
+          <a:r>
+            <a:rPr lang="pt-BR" sz="2700" kern="1200" dirty="0" smtClean="0">
+              <a:latin typeface="Calibri"/>
+            </a:rPr>
+            <a:t>/</a:t>
+          </a:r>
+          <a:r>
+            <a:rPr lang="pt-BR" sz="2700" kern="1200" dirty="0" err="1" smtClean="0">
+              <a:latin typeface="Calibri"/>
+            </a:rPr>
+            <a:t>Gitlab</a:t>
+          </a:r>
+          <a:endParaRPr lang="pt-BR" sz="2700" kern="1200" dirty="0">
+            <a:latin typeface="Calibri"/>
+          </a:endParaRPr>
         </a:p>
       </dsp:txBody>
       <dsp:txXfrm>
@@ -3436,7 +3545,7 @@
           <a:p>
             <a:fld id="{4C9BD92C-A4FD-4438-A5CF-9C69237A3F41}" type="datetimeFigureOut">
               <a:rPr lang="pt-BR" smtClean="0"/>
-              <a:t>06/04/2020</a:t>
+              <a:t>07/04/2020</a:t>
             </a:fld>
             <a:endParaRPr lang="pt-BR"/>
           </a:p>
@@ -3787,6 +3896,90 @@
 </p:notes>
 </file>
 
+<file path=ppt/notesSlides/notesSlide2.xml><?xml version="1.0" encoding="utf-8"?>
+<p:notes xmlns:a="http://schemas.openxmlformats.org/drawingml/2006/main" xmlns:r="http://schemas.openxmlformats.org/officeDocument/2006/relationships" xmlns:p="http://schemas.openxmlformats.org/presentationml/2006/main">
+  <p:cSld>
+    <p:spTree>
+      <p:nvGrpSpPr>
+        <p:cNvPr id="1" name=""/>
+        <p:cNvGrpSpPr/>
+        <p:nvPr/>
+      </p:nvGrpSpPr>
+      <p:grpSpPr>
+        <a:xfrm>
+          <a:off x="0" y="0"/>
+          <a:ext cx="0" cy="0"/>
+          <a:chOff x="0" y="0"/>
+          <a:chExt cx="0" cy="0"/>
+        </a:xfrm>
+      </p:grpSpPr>
+      <p:sp>
+        <p:nvSpPr>
+          <p:cNvPr id="2" name="Espaço Reservado para Imagem de Slide 1"/>
+          <p:cNvSpPr>
+            <a:spLocks noGrp="1" noRot="1" noChangeAspect="1"/>
+          </p:cNvSpPr>
+          <p:nvPr>
+            <p:ph type="sldImg"/>
+          </p:nvPr>
+        </p:nvSpPr>
+        <p:spPr/>
+      </p:sp>
+      <p:sp>
+        <p:nvSpPr>
+          <p:cNvPr id="3" name="Espaço Reservado para Anotações 2"/>
+          <p:cNvSpPr>
+            <a:spLocks noGrp="1"/>
+          </p:cNvSpPr>
+          <p:nvPr>
+            <p:ph type="body" idx="1"/>
+          </p:nvPr>
+        </p:nvSpPr>
+        <p:spPr/>
+        <p:txBody>
+          <a:bodyPr/>
+          <a:lstStyle/>
+          <a:p>
+            <a:endParaRPr lang="pt-BR"/>
+          </a:p>
+        </p:txBody>
+      </p:sp>
+      <p:sp>
+        <p:nvSpPr>
+          <p:cNvPr id="4" name="Espaço Reservado para Número de Slide 3"/>
+          <p:cNvSpPr>
+            <a:spLocks noGrp="1"/>
+          </p:cNvSpPr>
+          <p:nvPr>
+            <p:ph type="sldNum" sz="quarter" idx="10"/>
+          </p:nvPr>
+        </p:nvSpPr>
+        <p:spPr/>
+        <p:txBody>
+          <a:bodyPr/>
+          <a:lstStyle/>
+          <a:p>
+            <a:fld id="{D31B08E1-9A3D-4579-B02E-C0227531CB02}" type="slidenum">
+              <a:rPr lang="pt-BR" smtClean="0"/>
+              <a:t>2</a:t>
+            </a:fld>
+            <a:endParaRPr lang="pt-BR"/>
+          </a:p>
+        </p:txBody>
+      </p:sp>
+    </p:spTree>
+    <p:extLst>
+      <p:ext uri="{BB962C8B-B14F-4D97-AF65-F5344CB8AC3E}">
+        <p14:creationId xmlns:p14="http://schemas.microsoft.com/office/powerpoint/2010/main" val="879525493"/>
+      </p:ext>
+    </p:extLst>
+  </p:cSld>
+  <p:clrMapOvr>
+    <a:masterClrMapping/>
+  </p:clrMapOvr>
+</p:notes>
+</file>
+
 <file path=ppt/slideLayouts/slideLayout1.xml><?xml version="1.0" encoding="utf-8"?>
 <p:sldLayout xmlns:a="http://schemas.openxmlformats.org/drawingml/2006/main" xmlns:r="http://schemas.openxmlformats.org/officeDocument/2006/relationships" xmlns:p="http://schemas.openxmlformats.org/presentationml/2006/main" type="title" preserve="1">
   <p:cSld name="Slide de título">
@@ -3966,7 +4159,7 @@
           <a:p>
             <a:fld id="{B7604B81-05E4-4A8C-828D-3B39B782D070}" type="datetime1">
               <a:rPr lang="pt-BR" smtClean="0"/>
-              <a:t>06/04/2020</a:t>
+              <a:t>07/04/2020</a:t>
             </a:fld>
             <a:endParaRPr lang="pt-BR"/>
           </a:p>
@@ -4134,7 +4327,7 @@
           <a:p>
             <a:fld id="{1D721FFE-E8A8-4F14-A95B-901A53E2970B}" type="datetime1">
               <a:rPr lang="pt-BR" smtClean="0"/>
-              <a:t>06/04/2020</a:t>
+              <a:t>07/04/2020</a:t>
             </a:fld>
             <a:endParaRPr lang="pt-BR"/>
           </a:p>
@@ -4312,7 +4505,7 @@
           <a:p>
             <a:fld id="{16F1134B-E73D-475F-971B-A8606B928953}" type="datetime1">
               <a:rPr lang="pt-BR" smtClean="0"/>
-              <a:t>06/04/2020</a:t>
+              <a:t>07/04/2020</a:t>
             </a:fld>
             <a:endParaRPr lang="pt-BR"/>
           </a:p>
@@ -4480,7 +4673,7 @@
           <a:p>
             <a:fld id="{3AA05A0E-6E74-4597-8CA0-FFEA0EF2D511}" type="datetime1">
               <a:rPr lang="pt-BR" smtClean="0"/>
-              <a:t>06/04/2020</a:t>
+              <a:t>07/04/2020</a:t>
             </a:fld>
             <a:endParaRPr lang="pt-BR"/>
           </a:p>
@@ -4725,7 +4918,7 @@
           <a:p>
             <a:fld id="{04DBEEAA-58AF-4C92-9F19-C7A6D22F6D68}" type="datetime1">
               <a:rPr lang="pt-BR" smtClean="0"/>
-              <a:t>06/04/2020</a:t>
+              <a:t>07/04/2020</a:t>
             </a:fld>
             <a:endParaRPr lang="pt-BR"/>
           </a:p>
@@ -5010,7 +5203,7 @@
           <a:p>
             <a:fld id="{D752309C-DE97-444B-8AB5-2CB41AC7FC7D}" type="datetime1">
               <a:rPr lang="pt-BR" smtClean="0"/>
-              <a:t>06/04/2020</a:t>
+              <a:t>07/04/2020</a:t>
             </a:fld>
             <a:endParaRPr lang="pt-BR"/>
           </a:p>
@@ -5429,7 +5622,7 @@
           <a:p>
             <a:fld id="{92C08396-2BFD-4834-BFFE-BF6B747F88D1}" type="datetime1">
               <a:rPr lang="pt-BR" smtClean="0"/>
-              <a:t>06/04/2020</a:t>
+              <a:t>07/04/2020</a:t>
             </a:fld>
             <a:endParaRPr lang="pt-BR"/>
           </a:p>
@@ -5546,7 +5739,7 @@
           <a:p>
             <a:fld id="{51ADC98F-4FC1-4DE2-BC7B-740FB6A371B6}" type="datetime1">
               <a:rPr lang="pt-BR" smtClean="0"/>
-              <a:t>06/04/2020</a:t>
+              <a:t>07/04/2020</a:t>
             </a:fld>
             <a:endParaRPr lang="pt-BR"/>
           </a:p>
@@ -5641,7 +5834,7 @@
           <a:p>
             <a:fld id="{4CEFCCBB-7C2F-4252-B92D-B51068201CA7}" type="datetime1">
               <a:rPr lang="pt-BR" smtClean="0"/>
-              <a:t>06/04/2020</a:t>
+              <a:t>07/04/2020</a:t>
             </a:fld>
             <a:endParaRPr lang="pt-BR"/>
           </a:p>
@@ -5916,7 +6109,7 @@
           <a:p>
             <a:fld id="{E63C89AC-AE79-408E-9549-C97EA05357EA}" type="datetime1">
               <a:rPr lang="pt-BR" smtClean="0"/>
-              <a:t>06/04/2020</a:t>
+              <a:t>07/04/2020</a:t>
             </a:fld>
             <a:endParaRPr lang="pt-BR"/>
           </a:p>
@@ -6168,7 +6361,7 @@
           <a:p>
             <a:fld id="{02B8D528-9E99-4F27-B008-277763C8CF16}" type="datetime1">
               <a:rPr lang="pt-BR" smtClean="0"/>
-              <a:t>06/04/2020</a:t>
+              <a:t>07/04/2020</a:t>
             </a:fld>
             <a:endParaRPr lang="pt-BR"/>
           </a:p>
@@ -6379,7 +6572,7 @@
           <a:p>
             <a:fld id="{B36122C9-4136-4C64-A31B-8FD590908CB9}" type="datetime1">
               <a:rPr lang="pt-BR" smtClean="0"/>
-              <a:t>06/04/2020</a:t>
+              <a:t>07/04/2020</a:t>
             </a:fld>
             <a:endParaRPr lang="pt-BR"/>
           </a:p>
@@ -6768,10 +6961,10 @@
           <p:cNvPr id="9" name="Rectangle 11">
             <a:extLst>
               <a:ext uri="{FF2B5EF4-FFF2-40B4-BE49-F238E27FC236}">
-                <a16:creationId xmlns:a16="http://schemas.microsoft.com/office/drawing/2014/main" id="{823AC064-BC96-4F32-8AE1-B2FD38754823}"/>
+                <a16:creationId xmlns="" xmlns:a16="http://schemas.microsoft.com/office/drawing/2014/main" id="{823AC064-BC96-4F32-8AE1-B2FD38754823}"/>
               </a:ext>
               <a:ext uri="{C183D7F6-B498-43B3-948B-1728B52AA6E4}">
-                <adec:decorative xmlns:adec="http://schemas.microsoft.com/office/drawing/2017/decorative" val="1"/>
+                <adec:decorative xmlns="" xmlns:adec="http://schemas.microsoft.com/office/drawing/2017/decorative" val="1"/>
               </a:ext>
             </a:extLst>
           </p:cNvPr>
@@ -6781,7 +6974,7 @@
           <p:nvPr>
             <p:extLst>
               <p:ext uri="{386F3935-93C4-4BCD-93E2-E3B085C9AB24}">
-                <p16:designElem xmlns:p16="http://schemas.microsoft.com/office/powerpoint/2015/main" val="1"/>
+                <p16:designElem xmlns="" xmlns:p16="http://schemas.microsoft.com/office/powerpoint/2015/main" val="1"/>
               </p:ext>
             </p:extLst>
           </p:nvPr>
@@ -6905,10 +7098,10 @@
           <p:cNvPr id="10" name="Straight Connector 13">
             <a:extLst>
               <a:ext uri="{FF2B5EF4-FFF2-40B4-BE49-F238E27FC236}">
-                <a16:creationId xmlns:a16="http://schemas.microsoft.com/office/drawing/2014/main" id="{7E7C77BC-7138-40B1-A15B-20F57A494629}"/>
+                <a16:creationId xmlns="" xmlns:a16="http://schemas.microsoft.com/office/drawing/2014/main" id="{7E7C77BC-7138-40B1-A15B-20F57A494629}"/>
               </a:ext>
               <a:ext uri="{C183D7F6-B498-43B3-948B-1728B52AA6E4}">
-                <adec:decorative xmlns:adec="http://schemas.microsoft.com/office/drawing/2017/decorative" val="1"/>
+                <adec:decorative xmlns="" xmlns:adec="http://schemas.microsoft.com/office/drawing/2017/decorative" val="1"/>
               </a:ext>
             </a:extLst>
           </p:cNvPr>
@@ -6918,7 +7111,7 @@
           <p:nvPr>
             <p:extLst>
               <p:ext uri="{386F3935-93C4-4BCD-93E2-E3B085C9AB24}">
-                <p16:designElem xmlns:p16="http://schemas.microsoft.com/office/powerpoint/2015/main" val="1"/>
+                <p16:designElem xmlns="" xmlns:p16="http://schemas.microsoft.com/office/powerpoint/2015/main" val="1"/>
               </p:ext>
             </p:extLst>
           </p:nvPr>
@@ -6957,7 +7150,7 @@
           <p:cNvPr id="7" name="Imagem 7" descr="Uma imagem contendo edifício&#10;&#10;Descrição gerada com muito alta confiança">
             <a:extLst>
               <a:ext uri="{FF2B5EF4-FFF2-40B4-BE49-F238E27FC236}">
-                <a16:creationId xmlns:a16="http://schemas.microsoft.com/office/drawing/2014/main" id="{ED1C754E-7348-4CD1-8AB9-8462D3287270}"/>
+                <a16:creationId xmlns="" xmlns:a16="http://schemas.microsoft.com/office/drawing/2014/main" id="{ED1C754E-7348-4CD1-8AB9-8462D3287270}"/>
               </a:ext>
             </a:extLst>
           </p:cNvPr>
@@ -6987,10 +7180,10 @@
           <p:cNvPr id="11" name="Straight Connector 15">
             <a:extLst>
               <a:ext uri="{FF2B5EF4-FFF2-40B4-BE49-F238E27FC236}">
-                <a16:creationId xmlns:a16="http://schemas.microsoft.com/office/drawing/2014/main" id="{DB146403-F3D6-484B-B2ED-97F9565D0370}"/>
+                <a16:creationId xmlns="" xmlns:a16="http://schemas.microsoft.com/office/drawing/2014/main" id="{DB146403-F3D6-484B-B2ED-97F9565D0370}"/>
               </a:ext>
               <a:ext uri="{C183D7F6-B498-43B3-948B-1728B52AA6E4}">
-                <adec:decorative xmlns:adec="http://schemas.microsoft.com/office/drawing/2017/decorative" val="1"/>
+                <adec:decorative xmlns="" xmlns:adec="http://schemas.microsoft.com/office/drawing/2017/decorative" val="1"/>
               </a:ext>
             </a:extLst>
           </p:cNvPr>
@@ -7000,7 +7193,7 @@
           <p:nvPr>
             <p:extLst>
               <p:ext uri="{386F3935-93C4-4BCD-93E2-E3B085C9AB24}">
-                <p16:designElem xmlns:p16="http://schemas.microsoft.com/office/powerpoint/2015/main" val="1"/>
+                <p16:designElem xmlns="" xmlns:p16="http://schemas.microsoft.com/office/powerpoint/2015/main" val="1"/>
               </p:ext>
             </p:extLst>
           </p:nvPr>
@@ -7039,7 +7232,7 @@
           <p:cNvPr id="5" name="Imagem 5" descr="Uma imagem contendo relógio, placar&#10;&#10;Descrição gerada com muito alta confiança">
             <a:extLst>
               <a:ext uri="{FF2B5EF4-FFF2-40B4-BE49-F238E27FC236}">
-                <a16:creationId xmlns:a16="http://schemas.microsoft.com/office/drawing/2014/main" id="{1246C3A8-E792-4072-8CFD-8EED5F2066B7}"/>
+                <a16:creationId xmlns="" xmlns:a16="http://schemas.microsoft.com/office/drawing/2014/main" id="{1246C3A8-E792-4072-8CFD-8EED5F2066B7}"/>
               </a:ext>
             </a:extLst>
           </p:cNvPr>
@@ -7123,6 +7316,13 @@
   <p:clrMapOvr>
     <a:masterClrMapping/>
   </p:clrMapOvr>
+  <p:timing>
+    <p:tnLst>
+      <p:par>
+        <p:cTn id="1" dur="indefinite" restart="never" nodeType="tmRoot"/>
+      </p:par>
+    </p:tnLst>
+  </p:timing>
 </p:sld>
 </file>
 
@@ -7148,7 +7348,7 @@
           <p:cNvPr id="2" name="Título 1">
             <a:extLst>
               <a:ext uri="{FF2B5EF4-FFF2-40B4-BE49-F238E27FC236}">
-                <a16:creationId xmlns:a16="http://schemas.microsoft.com/office/drawing/2014/main" id="{959A6175-5425-4549-B5BD-FF4D502E4D80}"/>
+                <a16:creationId xmlns="" xmlns:a16="http://schemas.microsoft.com/office/drawing/2014/main" id="{959A6175-5425-4549-B5BD-FF4D502E4D80}"/>
               </a:ext>
             </a:extLst>
           </p:cNvPr>
@@ -7185,7 +7385,7 @@
           <p:cNvPr id="3" name="Espaço Reservado para Conteúdo 2">
             <a:extLst>
               <a:ext uri="{FF2B5EF4-FFF2-40B4-BE49-F238E27FC236}">
-                <a16:creationId xmlns:a16="http://schemas.microsoft.com/office/drawing/2014/main" id="{4F1C70B1-FDF7-441C-8666-EFC7389412A2}"/>
+                <a16:creationId xmlns="" xmlns:a16="http://schemas.microsoft.com/office/drawing/2014/main" id="{4F1C70B1-FDF7-441C-8666-EFC7389412A2}"/>
               </a:ext>
             </a:extLst>
           </p:cNvPr>
@@ -7209,72 +7409,78 @@
           <a:lstStyle/>
           <a:p>
             <a:r>
-              <a:rPr lang="pt-BR" dirty="0" err="1">
+              <a:rPr lang="pt-BR" b="1" dirty="0" err="1">
                 <a:cs typeface="Calibri"/>
               </a:rPr>
               <a:t>git</a:t>
             </a:r>
             <a:r>
+              <a:rPr lang="pt-BR" b="1" dirty="0">
+                <a:cs typeface="Calibri"/>
+              </a:rPr>
+              <a:t> </a:t>
+            </a:r>
+            <a:r>
+              <a:rPr lang="pt-BR" b="1" dirty="0" err="1">
+                <a:cs typeface="Calibri"/>
+              </a:rPr>
+              <a:t>init</a:t>
+            </a:r>
+            <a:r>
               <a:rPr lang="pt-BR" dirty="0">
                 <a:cs typeface="Calibri"/>
               </a:rPr>
-              <a:t> </a:t>
-            </a:r>
-            <a:r>
-              <a:rPr lang="pt-BR" dirty="0" err="1">
+              <a:t>: cria um repositório vazio ou </a:t>
+            </a:r>
+            <a:r>
+              <a:rPr lang="pt-BR" dirty="0" smtClean="0">
                 <a:cs typeface="Calibri"/>
               </a:rPr>
-              <a:t>init</a:t>
+              <a:t>reinicializa </a:t>
             </a:r>
             <a:r>
               <a:rPr lang="pt-BR" dirty="0">
                 <a:cs typeface="Calibri"/>
               </a:rPr>
-              <a:t>: cria um repositório vazio ou (</a:t>
-            </a:r>
-            <a:r>
-              <a:rPr lang="pt-BR" dirty="0" err="1">
+              <a:t>um;</a:t>
+            </a:r>
+          </a:p>
+          <a:p>
+            <a:r>
+              <a:rPr lang="pt-BR" b="1" dirty="0" err="1">
                 <a:cs typeface="Calibri"/>
               </a:rPr>
-              <a:t>re</a:t>
+              <a:t>git</a:t>
+            </a:r>
+            <a:r>
+              <a:rPr lang="pt-BR" b="1" dirty="0">
+                <a:cs typeface="Calibri"/>
+              </a:rPr>
+              <a:t> clone</a:t>
             </a:r>
             <a:r>
               <a:rPr lang="pt-BR" dirty="0">
                 <a:cs typeface="Calibri"/>
               </a:rPr>
-              <a:t>)inicializa um;</a:t>
-            </a:r>
-          </a:p>
-          <a:p>
-            <a:r>
-              <a:rPr lang="pt-BR" dirty="0" err="1">
+              <a:t>: permite fazer o download do repositório remoto para sua máquina local;</a:t>
+            </a:r>
+            <a:endParaRPr lang="pt-BR" dirty="0"/>
+          </a:p>
+          <a:p>
+            <a:r>
+              <a:rPr lang="pt-BR" b="1" dirty="0" err="1">
                 <a:cs typeface="Calibri"/>
               </a:rPr>
               <a:t>git</a:t>
             </a:r>
             <a:r>
-              <a:rPr lang="pt-BR" dirty="0">
-                <a:cs typeface="Calibri"/>
-              </a:rPr>
-              <a:t> clone: permite fazer o download do repositório remoto para sua máquina local;</a:t>
-            </a:r>
-            <a:endParaRPr lang="pt-BR"/>
-          </a:p>
-          <a:p>
-            <a:r>
-              <a:rPr lang="pt-BR" dirty="0" err="1">
-                <a:cs typeface="Calibri"/>
-              </a:rPr>
-              <a:t>git</a:t>
-            </a:r>
-            <a:r>
-              <a:rPr lang="pt-BR" dirty="0">
+              <a:rPr lang="pt-BR" b="1" dirty="0">
                 <a:cs typeface="Calibri"/>
               </a:rPr>
               <a:t> </a:t>
             </a:r>
             <a:r>
-              <a:rPr lang="pt-BR" dirty="0" err="1">
+              <a:rPr lang="pt-BR" b="1" dirty="0" err="1">
                 <a:cs typeface="Calibri"/>
               </a:rPr>
               <a:t>pull</a:t>
@@ -7288,19 +7494,19 @@
           </a:p>
           <a:p>
             <a:r>
-              <a:rPr lang="pt-BR" dirty="0" err="1">
+              <a:rPr lang="pt-BR" b="1" dirty="0" err="1">
                 <a:cs typeface="Calibri"/>
               </a:rPr>
               <a:t>git</a:t>
             </a:r>
             <a:r>
-              <a:rPr lang="pt-BR" dirty="0">
+              <a:rPr lang="pt-BR" b="1" dirty="0">
                 <a:cs typeface="Calibri"/>
               </a:rPr>
               <a:t> </a:t>
             </a:r>
             <a:r>
-              <a:rPr lang="pt-BR" dirty="0" err="1">
+              <a:rPr lang="pt-BR" b="1" dirty="0" err="1">
                 <a:cs typeface="Calibri"/>
               </a:rPr>
               <a:t>add</a:t>
@@ -7326,19 +7532,19 @@
           </a:p>
           <a:p>
             <a:r>
-              <a:rPr lang="pt-BR" dirty="0" err="1">
+              <a:rPr lang="pt-BR" b="1" dirty="0" err="1">
                 <a:cs typeface="Calibri"/>
               </a:rPr>
               <a:t>git</a:t>
             </a:r>
             <a:r>
-              <a:rPr lang="pt-BR" dirty="0">
+              <a:rPr lang="pt-BR" b="1" dirty="0">
                 <a:cs typeface="Calibri"/>
               </a:rPr>
               <a:t> </a:t>
             </a:r>
             <a:r>
-              <a:rPr lang="pt-BR" dirty="0" err="1">
+              <a:rPr lang="pt-BR" b="1" dirty="0" err="1">
                 <a:cs typeface="Calibri"/>
               </a:rPr>
               <a:t>commit</a:t>
@@ -7352,19 +7558,19 @@
           </a:p>
           <a:p>
             <a:r>
-              <a:rPr lang="pt-BR" dirty="0" err="1">
+              <a:rPr lang="pt-BR" b="1" dirty="0" err="1">
                 <a:cs typeface="Calibri"/>
               </a:rPr>
               <a:t>git</a:t>
             </a:r>
             <a:r>
-              <a:rPr lang="pt-BR" dirty="0">
+              <a:rPr lang="pt-BR" b="1" dirty="0">
                 <a:cs typeface="Calibri"/>
               </a:rPr>
               <a:t> </a:t>
             </a:r>
             <a:r>
-              <a:rPr lang="pt-BR" dirty="0" err="1">
+              <a:rPr lang="pt-BR" b="1" dirty="0" err="1">
                 <a:cs typeface="Calibri"/>
               </a:rPr>
               <a:t>push</a:t>
@@ -7391,6 +7597,13 @@
   <p:clrMapOvr>
     <a:masterClrMapping/>
   </p:clrMapOvr>
+  <p:timing>
+    <p:tnLst>
+      <p:par>
+        <p:cTn id="1" dur="indefinite" restart="never" nodeType="tmRoot"/>
+      </p:par>
+    </p:tnLst>
+  </p:timing>
 </p:sld>
 </file>
 
@@ -7561,6 +7774,13 @@
   <p:clrMapOvr>
     <a:masterClrMapping/>
   </p:clrMapOvr>
+  <p:timing>
+    <p:tnLst>
+      <p:par>
+        <p:cTn id="1" dur="indefinite" restart="never" nodeType="tmRoot"/>
+      </p:par>
+    </p:tnLst>
+  </p:timing>
 </p:sld>
 </file>
 
@@ -7692,6 +7912,13 @@
   <p:clrMapOvr>
     <a:masterClrMapping/>
   </p:clrMapOvr>
+  <p:timing>
+    <p:tnLst>
+      <p:par>
+        <p:cTn id="1" dur="indefinite" restart="never" nodeType="tmRoot"/>
+      </p:par>
+    </p:tnLst>
+  </p:timing>
 </p:sld>
 </file>
 
@@ -7751,7 +7978,7 @@
             <p:ph idx="1"/>
             <p:extLst>
               <p:ext uri="{D42A27DB-BD31-4B8C-83A1-F6EECF244321}">
-                <p14:modId xmlns:p14="http://schemas.microsoft.com/office/powerpoint/2010/main" val="2036627898"/>
+                <p14:modId xmlns:p14="http://schemas.microsoft.com/office/powerpoint/2010/main" val="608906246"/>
               </p:ext>
             </p:extLst>
           </p:nvPr>
@@ -7762,7 +7989,7 @@
         </p:xfrm>
         <a:graphic>
           <a:graphicData uri="http://schemas.openxmlformats.org/drawingml/2006/diagram">
-            <dgm:relIds xmlns:dgm="http://schemas.openxmlformats.org/drawingml/2006/diagram" xmlns:r="http://schemas.openxmlformats.org/officeDocument/2006/relationships" r:dm="rId2" r:lo="rId3" r:qs="rId4" r:cs="rId5"/>
+            <dgm:relIds xmlns:dgm="http://schemas.openxmlformats.org/drawingml/2006/diagram" xmlns:r="http://schemas.openxmlformats.org/officeDocument/2006/relationships" r:dm="rId3" r:lo="rId4" r:qs="rId5" r:cs="rId6"/>
           </a:graphicData>
         </a:graphic>
       </p:graphicFrame>
@@ -7782,7 +8009,7 @@
           <a:lstStyle/>
           <a:p>
             <a:r>
-              <a:rPr lang="pt-BR"/>
+              <a:rPr lang="pt-BR" dirty="0"/>
               <a:t>Sistema Distribuídos - Prof. João Ferreira</a:t>
             </a:r>
           </a:p>
@@ -7821,6 +8048,13 @@
   <p:clrMapOvr>
     <a:masterClrMapping/>
   </p:clrMapOvr>
+  <p:timing>
+    <p:tnLst>
+      <p:par>
+        <p:cTn id="1" dur="indefinite" restart="never" nodeType="tmRoot"/>
+      </p:par>
+    </p:tnLst>
+  </p:timing>
 </p:sld>
 </file>
 
@@ -7903,7 +8137,7 @@
           <p:cNvPr id="5" name="Imagem 7" descr="Uma imagem contendo objeto, placar&#10;&#10;Descrição gerada com muito alta confiança">
             <a:extLst>
               <a:ext uri="{FF2B5EF4-FFF2-40B4-BE49-F238E27FC236}">
-                <a16:creationId xmlns:a16="http://schemas.microsoft.com/office/drawing/2014/main" id="{C8B46D58-1D20-46CB-A0F4-F9A9A9B33D12}"/>
+                <a16:creationId xmlns="" xmlns:a16="http://schemas.microsoft.com/office/drawing/2014/main" id="{C8B46D58-1D20-46CB-A0F4-F9A9A9B33D12}"/>
               </a:ext>
             </a:extLst>
           </p:cNvPr>
@@ -8053,6 +8287,13 @@
   <p:clrMapOvr>
     <a:masterClrMapping/>
   </p:clrMapOvr>
+  <p:timing>
+    <p:tnLst>
+      <p:par>
+        <p:cTn id="1" dur="indefinite" restart="never" nodeType="tmRoot"/>
+      </p:par>
+    </p:tnLst>
+  </p:timing>
 </p:sld>
 </file>
 
@@ -8168,12 +8409,8 @@
               <a:t>Através do GIT é possível ter acesso ao histórico de alterações dos arquivos de um projeto, compartilhamento de projetos e </a:t>
             </a:r>
             <a:r>
-              <a:rPr lang="pt-BR" sz="2400" dirty="0" err="1"/>
-              <a:t>etc</a:t>
-            </a:r>
-            <a:r>
-              <a:rPr lang="pt-BR" sz="2400" dirty="0"/>
-              <a:t>;</a:t>
+              <a:rPr lang="pt-BR" sz="2400" dirty="0" smtClean="0"/>
+              <a:t>etc...;</a:t>
             </a:r>
             <a:endParaRPr lang="pt-BR" sz="2400" dirty="0">
               <a:cs typeface="Calibri"/>
@@ -8282,6 +8519,13 @@
   <p:clrMapOvr>
     <a:masterClrMapping/>
   </p:clrMapOvr>
+  <p:timing>
+    <p:tnLst>
+      <p:par>
+        <p:cTn id="1" dur="indefinite" restart="never" nodeType="tmRoot"/>
+      </p:par>
+    </p:tnLst>
+  </p:timing>
 </p:sld>
 </file>
 
@@ -8379,16 +8623,22 @@
               <a:t> </a:t>
             </a:r>
             <a:r>
-              <a:rPr lang="pt-BR" sz="2400" dirty="0" err="1">
-                <a:cs typeface="Calibri"/>
-              </a:rPr>
-              <a:t>é</a:t>
-            </a:r>
-            <a:r>
               <a:rPr lang="pt-BR" sz="2400" dirty="0">
                 <a:cs typeface="Calibri"/>
               </a:rPr>
-              <a:t> website que permite a hospedagem de códigos fonte para repositório </a:t>
+              <a:t>é </a:t>
+            </a:r>
+            <a:r>
+              <a:rPr lang="pt-BR" sz="2400" dirty="0" smtClean="0">
+                <a:cs typeface="Calibri"/>
+              </a:rPr>
+              <a:t>o website </a:t>
+            </a:r>
+            <a:r>
+              <a:rPr lang="pt-BR" sz="2400" dirty="0">
+                <a:cs typeface="Calibri"/>
+              </a:rPr>
+              <a:t>que permite a hospedagem de códigos fonte para repositório </a:t>
             </a:r>
             <a:r>
               <a:rPr lang="pt-BR" sz="2400" dirty="0" err="1">
@@ -8402,7 +8652,7 @@
               </a:rPr>
               <a:t>;</a:t>
             </a:r>
-            <a:endParaRPr lang="pt-BR" sz="2400" dirty="0" err="1"/>
+            <a:endParaRPr lang="pt-BR" sz="2400" dirty="0"/>
           </a:p>
           <a:p>
             <a:r>
@@ -8525,6 +8775,13 @@
   <p:clrMapOvr>
     <a:masterClrMapping/>
   </p:clrMapOvr>
+  <p:timing>
+    <p:tnLst>
+      <p:par>
+        <p:cTn id="1" dur="indefinite" restart="never" nodeType="tmRoot"/>
+      </p:par>
+    </p:tnLst>
+  </p:timing>
 </p:sld>
 </file>
 
@@ -8576,7 +8833,7 @@
           <a:lstStyle/>
           <a:p>
             <a:r>
-              <a:rPr lang="pt-BR" sz="3100"/>
+              <a:rPr lang="pt-BR" sz="3100" b="1" dirty="0"/>
               <a:t>Instalação Cliente</a:t>
             </a:r>
           </a:p>
@@ -8587,7 +8844,7 @@
           <p:cNvPr id="4" name="Imagem 6" descr="Tela de celular com publicação numa rede social&#10;&#10;Descrição gerada com alta confiança">
             <a:extLst>
               <a:ext uri="{FF2B5EF4-FFF2-40B4-BE49-F238E27FC236}">
-                <a16:creationId xmlns:a16="http://schemas.microsoft.com/office/drawing/2014/main" id="{88C0DEBE-9D8E-4BFB-9E88-CE610E946829}"/>
+                <a16:creationId xmlns="" xmlns:a16="http://schemas.microsoft.com/office/drawing/2014/main" id="{88C0DEBE-9D8E-4BFB-9E88-CE610E946829}"/>
               </a:ext>
             </a:extLst>
           </p:cNvPr>
@@ -8850,6 +9107,13 @@
   <p:clrMapOvr>
     <a:masterClrMapping/>
   </p:clrMapOvr>
+  <p:timing>
+    <p:tnLst>
+      <p:par>
+        <p:cTn id="1" dur="indefinite" restart="never" nodeType="tmRoot"/>
+      </p:par>
+    </p:tnLst>
+  </p:timing>
 </p:sld>
 </file>
 
@@ -8883,10 +9147,10 @@
           <p:cNvPr id="11" name="Rectangle 10">
             <a:extLst>
               <a:ext uri="{FF2B5EF4-FFF2-40B4-BE49-F238E27FC236}">
-                <a16:creationId xmlns:a16="http://schemas.microsoft.com/office/drawing/2014/main" id="{867D4867-5BA7-4462-B2F6-A23F4A622AA7}"/>
+                <a16:creationId xmlns="" xmlns:a16="http://schemas.microsoft.com/office/drawing/2014/main" id="{867D4867-5BA7-4462-B2F6-A23F4A622AA7}"/>
               </a:ext>
               <a:ext uri="{C183D7F6-B498-43B3-948B-1728B52AA6E4}">
-                <adec:decorative xmlns:adec="http://schemas.microsoft.com/office/drawing/2017/decorative" val="1"/>
+                <adec:decorative xmlns="" xmlns:adec="http://schemas.microsoft.com/office/drawing/2017/decorative" val="1"/>
               </a:ext>
             </a:extLst>
           </p:cNvPr>
@@ -8896,7 +9160,7 @@
           <p:nvPr>
             <p:extLst>
               <p:ext uri="{386F3935-93C4-4BCD-93E2-E3B085C9AB24}">
-                <p16:designElem xmlns:p16="http://schemas.microsoft.com/office/powerpoint/2015/main" val="1"/>
+                <p16:designElem xmlns="" xmlns:p16="http://schemas.microsoft.com/office/powerpoint/2015/main" val="1"/>
               </p:ext>
             </p:extLst>
           </p:nvPr>
@@ -8951,8 +9215,8 @@
         </p:nvSpPr>
         <p:spPr>
           <a:xfrm>
-            <a:off x="482601" y="623392"/>
-            <a:ext cx="2522980" cy="1607060"/>
+            <a:off x="395536" y="623392"/>
+            <a:ext cx="2736303" cy="1607060"/>
           </a:xfrm>
           <a:noFill/>
           <a:ln w="19050">
@@ -8968,7 +9232,7 @@
           <a:lstStyle/>
           <a:p>
             <a:r>
-              <a:rPr lang="pt-BR" sz="2400"/>
+              <a:rPr lang="pt-BR" sz="2400" b="1" dirty="0"/>
               <a:t>Uso Cliente</a:t>
             </a:r>
           </a:p>
@@ -8986,8 +9250,8 @@
         </p:nvSpPr>
         <p:spPr>
           <a:xfrm>
-            <a:off x="482601" y="2638043"/>
-            <a:ext cx="2522980" cy="3415623"/>
+            <a:off x="323528" y="2638043"/>
+            <a:ext cx="2808311" cy="3415623"/>
           </a:xfrm>
         </p:spPr>
         <p:txBody>
@@ -9000,24 +9264,135 @@
               <a:buNone/>
             </a:pPr>
             <a:r>
-              <a:rPr lang="pt-BR" sz="1700">
+              <a:rPr lang="pt-BR" sz="1700" dirty="0">
                 <a:cs typeface="Calibri"/>
               </a:rPr>
-              <a:t>Após instalado, para fazer um download de repositório que esteja no Github, basta seguir o comando: </a:t>
-            </a:r>
-            <a:r>
-              <a:rPr lang="pt-BR" sz="1700">
+              <a:t>Após instalado, para fazer </a:t>
+            </a:r>
+            <a:r>
+              <a:rPr lang="pt-BR" sz="1700" dirty="0" smtClean="0">
+                <a:cs typeface="Calibri"/>
+              </a:rPr>
+              <a:t>o download de um </a:t>
+            </a:r>
+            <a:r>
+              <a:rPr lang="pt-BR" sz="1700" dirty="0">
+                <a:cs typeface="Calibri"/>
+              </a:rPr>
+              <a:t>repositório que esteja no </a:t>
+            </a:r>
+            <a:r>
+              <a:rPr lang="pt-BR" sz="1700" dirty="0" err="1">
+                <a:cs typeface="Calibri"/>
+              </a:rPr>
+              <a:t>Github</a:t>
+            </a:r>
+            <a:r>
+              <a:rPr lang="pt-BR" sz="1700" dirty="0">
+                <a:cs typeface="Calibri"/>
+              </a:rPr>
+              <a:t>, basta </a:t>
+            </a:r>
+            <a:r>
+              <a:rPr lang="pt-BR" sz="1700" dirty="0" smtClean="0">
+                <a:cs typeface="Calibri"/>
+              </a:rPr>
+              <a:t>abrir o terminal e seguir </a:t>
+            </a:r>
+            <a:r>
+              <a:rPr lang="pt-BR" sz="1700" dirty="0">
+                <a:cs typeface="Calibri"/>
+              </a:rPr>
+              <a:t>o comando: </a:t>
+            </a:r>
+            <a:endParaRPr lang="pt-BR" sz="1700" dirty="0" smtClean="0">
+              <a:cs typeface="Calibri"/>
+            </a:endParaRPr>
+          </a:p>
+          <a:p>
+            <a:pPr marL="0" indent="0">
+              <a:buNone/>
+            </a:pPr>
+            <a:r>
+              <a:rPr lang="pt-BR" sz="1700" i="1" dirty="0" err="1" smtClean="0">
                 <a:ea typeface="+mn-lt"/>
                 <a:cs typeface="+mn-lt"/>
               </a:rPr>
-              <a:t>git clone link_do_repositorio. Veja:</a:t>
+              <a:t>git</a:t>
+            </a:r>
+            <a:r>
+              <a:rPr lang="pt-BR" sz="1700" i="1" dirty="0" smtClean="0">
+                <a:ea typeface="+mn-lt"/>
+                <a:cs typeface="+mn-lt"/>
+              </a:rPr>
+              <a:t> clone </a:t>
+            </a:r>
+            <a:r>
+              <a:rPr lang="pt-BR" sz="1700" i="1" dirty="0" err="1" smtClean="0">
+                <a:ea typeface="+mn-lt"/>
+                <a:cs typeface="+mn-lt"/>
+              </a:rPr>
+              <a:t>link_do_repositorio</a:t>
+            </a:r>
+            <a:r>
+              <a:rPr lang="pt-BR" sz="1700" i="1" dirty="0" smtClean="0">
+                <a:ea typeface="+mn-lt"/>
+                <a:cs typeface="+mn-lt"/>
+              </a:rPr>
+              <a:t>.</a:t>
             </a:r>
           </a:p>
           <a:p>
             <a:pPr marL="0" indent="0">
               <a:buNone/>
             </a:pPr>
-            <a:endParaRPr lang="pt-BR" sz="1700">
+            <a:endParaRPr lang="pt-BR" sz="1700" dirty="0" smtClean="0">
+              <a:ea typeface="+mn-lt"/>
+              <a:cs typeface="+mn-lt"/>
+            </a:endParaRPr>
+          </a:p>
+          <a:p>
+            <a:pPr marL="0" indent="0">
+              <a:buNone/>
+            </a:pPr>
+            <a:endParaRPr lang="pt-BR" sz="1700" dirty="0">
+              <a:ea typeface="+mn-lt"/>
+              <a:cs typeface="+mn-lt"/>
+            </a:endParaRPr>
+          </a:p>
+          <a:p>
+            <a:pPr marL="0" indent="0">
+              <a:buNone/>
+            </a:pPr>
+            <a:endParaRPr lang="pt-BR" sz="1700" dirty="0">
+              <a:ea typeface="+mn-lt"/>
+              <a:cs typeface="+mn-lt"/>
+            </a:endParaRPr>
+          </a:p>
+          <a:p>
+            <a:pPr marL="0" indent="0">
+              <a:buNone/>
+            </a:pPr>
+            <a:r>
+              <a:rPr lang="pt-BR" sz="1700" b="1" dirty="0" smtClean="0">
+                <a:ea typeface="+mn-lt"/>
+                <a:cs typeface="+mn-lt"/>
+              </a:rPr>
+              <a:t>Veja</a:t>
+            </a:r>
+            <a:r>
+              <a:rPr lang="pt-BR" sz="1700" b="1" dirty="0">
+                <a:ea typeface="+mn-lt"/>
+                <a:cs typeface="+mn-lt"/>
+              </a:rPr>
+              <a:t>:</a:t>
+            </a:r>
+          </a:p>
+          <a:p>
+            <a:pPr marL="0" indent="0">
+              <a:buNone/>
+            </a:pPr>
+            <a:endParaRPr lang="pt-BR" sz="1700" dirty="0">
               <a:cs typeface="Calibri"/>
             </a:endParaRPr>
           </a:p>
@@ -9028,7 +9403,7 @@
           <p:cNvPr id="4" name="Imagem 6" descr="Tela de celular com texto preto sobre fundo branco&#10;&#10;Descrição gerada com alta confiança">
             <a:extLst>
               <a:ext uri="{FF2B5EF4-FFF2-40B4-BE49-F238E27FC236}">
-                <a16:creationId xmlns:a16="http://schemas.microsoft.com/office/drawing/2014/main" id="{7C5A323A-4118-4AB3-810E-F157637D9AEE}"/>
+                <a16:creationId xmlns="" xmlns:a16="http://schemas.microsoft.com/office/drawing/2014/main" id="{7C5A323A-4118-4AB3-810E-F157637D9AEE}"/>
               </a:ext>
             </a:extLst>
           </p:cNvPr>
@@ -9137,6 +9512,13 @@
   <p:clrMapOvr>
     <a:overrideClrMapping bg1="dk1" tx1="lt1" bg2="dk2" tx2="lt2" accent1="accent1" accent2="accent2" accent3="accent3" accent4="accent4" accent5="accent5" accent6="accent6" hlink="hlink" folHlink="folHlink"/>
   </p:clrMapOvr>
+  <p:timing>
+    <p:tnLst>
+      <p:par>
+        <p:cTn id="1" dur="indefinite" restart="never" nodeType="tmRoot"/>
+      </p:par>
+    </p:tnLst>
+  </p:timing>
 </p:sld>
 </file>
 
@@ -9170,10 +9552,10 @@
           <p:cNvPr id="9" name="Rectangle 8">
             <a:extLst>
               <a:ext uri="{FF2B5EF4-FFF2-40B4-BE49-F238E27FC236}">
-                <a16:creationId xmlns:a16="http://schemas.microsoft.com/office/drawing/2014/main" id="{14995E8B-DB3C-4E23-9186-1613402BFDCF}"/>
+                <a16:creationId xmlns="" xmlns:a16="http://schemas.microsoft.com/office/drawing/2014/main" id="{14995E8B-DB3C-4E23-9186-1613402BFDCF}"/>
               </a:ext>
               <a:ext uri="{C183D7F6-B498-43B3-948B-1728B52AA6E4}">
-                <adec:decorative xmlns:adec="http://schemas.microsoft.com/office/drawing/2017/decorative" val="1"/>
+                <adec:decorative xmlns="" xmlns:adec="http://schemas.microsoft.com/office/drawing/2017/decorative" val="1"/>
               </a:ext>
             </a:extLst>
           </p:cNvPr>
@@ -9183,7 +9565,7 @@
           <p:nvPr>
             <p:extLst>
               <p:ext uri="{386F3935-93C4-4BCD-93E2-E3B085C9AB24}">
-                <p16:designElem xmlns:p16="http://schemas.microsoft.com/office/powerpoint/2015/main" val="1"/>
+                <p16:designElem xmlns="" xmlns:p16="http://schemas.microsoft.com/office/powerpoint/2015/main" val="1"/>
               </p:ext>
             </p:extLst>
           </p:nvPr>
@@ -9233,10 +9615,10 @@
           <p:cNvPr id="11" name="Rectangle 10">
             <a:extLst>
               <a:ext uri="{FF2B5EF4-FFF2-40B4-BE49-F238E27FC236}">
-                <a16:creationId xmlns:a16="http://schemas.microsoft.com/office/drawing/2014/main" id="{CF21E7C5-2080-4549-97AA-9A6688257789}"/>
+                <a16:creationId xmlns="" xmlns:a16="http://schemas.microsoft.com/office/drawing/2014/main" id="{CF21E7C5-2080-4549-97AA-9A6688257789}"/>
               </a:ext>
               <a:ext uri="{C183D7F6-B498-43B3-948B-1728B52AA6E4}">
-                <adec:decorative xmlns:adec="http://schemas.microsoft.com/office/drawing/2017/decorative" val="1"/>
+                <adec:decorative xmlns="" xmlns:adec="http://schemas.microsoft.com/office/drawing/2017/decorative" val="1"/>
               </a:ext>
             </a:extLst>
           </p:cNvPr>
@@ -9246,7 +9628,7 @@
           <p:nvPr>
             <p:extLst>
               <p:ext uri="{386F3935-93C4-4BCD-93E2-E3B085C9AB24}">
-                <p16:designElem xmlns:p16="http://schemas.microsoft.com/office/powerpoint/2015/main" val="1"/>
+                <p16:designElem xmlns="" xmlns:p16="http://schemas.microsoft.com/office/powerpoint/2015/main" val="1"/>
               </p:ext>
             </p:extLst>
           </p:nvPr>
@@ -9298,10 +9680,10 @@
           <p:cNvPr id="13" name="Group 12">
             <a:extLst>
               <a:ext uri="{FF2B5EF4-FFF2-40B4-BE49-F238E27FC236}">
-                <a16:creationId xmlns:a16="http://schemas.microsoft.com/office/drawing/2014/main" id="{58454601-8C5B-41C4-8012-BF42AE4E16F2}"/>
+                <a16:creationId xmlns="" xmlns:a16="http://schemas.microsoft.com/office/drawing/2014/main" id="{58454601-8C5B-41C4-8012-BF42AE4E16F2}"/>
               </a:ext>
               <a:ext uri="{C183D7F6-B498-43B3-948B-1728B52AA6E4}">
-                <adec:decorative xmlns:adec="http://schemas.microsoft.com/office/drawing/2017/decorative" val="1"/>
+                <adec:decorative xmlns="" xmlns:adec="http://schemas.microsoft.com/office/drawing/2017/decorative" val="1"/>
               </a:ext>
             </a:extLst>
           </p:cNvPr>
@@ -9311,7 +9693,7 @@
           <p:nvPr>
             <p:extLst>
               <p:ext uri="{386F3935-93C4-4BCD-93E2-E3B085C9AB24}">
-                <p16:designElem xmlns:p16="http://schemas.microsoft.com/office/powerpoint/2015/main" val="1"/>
+                <p16:designElem xmlns="" xmlns:p16="http://schemas.microsoft.com/office/powerpoint/2015/main" val="1"/>
               </p:ext>
             </p:extLst>
           </p:nvPr>
@@ -9329,10 +9711,10 @@
             <p:cNvPr id="14" name="Oval 13">
               <a:extLst>
                 <a:ext uri="{FF2B5EF4-FFF2-40B4-BE49-F238E27FC236}">
-                  <a16:creationId xmlns:a16="http://schemas.microsoft.com/office/drawing/2014/main" id="{7DC402C5-77D9-4E58-85B2-94FDC43054BC}"/>
+                  <a16:creationId xmlns="" xmlns:a16="http://schemas.microsoft.com/office/drawing/2014/main" id="{7DC402C5-77D9-4E58-85B2-94FDC43054BC}"/>
                 </a:ext>
                 <a:ext uri="{C183D7F6-B498-43B3-948B-1728B52AA6E4}">
-                  <adec:decorative xmlns:adec="http://schemas.microsoft.com/office/drawing/2017/decorative" val="1"/>
+                  <adec:decorative xmlns="" xmlns:adec="http://schemas.microsoft.com/office/drawing/2017/decorative" val="1"/>
                 </a:ext>
               </a:extLst>
             </p:cNvPr>
@@ -9340,7 +9722,7 @@
             <p:nvPr>
               <p:extLst>
                 <p:ext uri="{386F3935-93C4-4BCD-93E2-E3B085C9AB24}">
-                  <p16:designElem xmlns:p16="http://schemas.microsoft.com/office/powerpoint/2015/main" val="1"/>
+                  <p16:designElem xmlns="" xmlns:p16="http://schemas.microsoft.com/office/powerpoint/2015/main" val="1"/>
                 </p:ext>
               </p:extLst>
             </p:nvPr>
@@ -9406,10 +9788,10 @@
             <p:cNvPr id="15" name="Oval 14">
               <a:extLst>
                 <a:ext uri="{FF2B5EF4-FFF2-40B4-BE49-F238E27FC236}">
-                  <a16:creationId xmlns:a16="http://schemas.microsoft.com/office/drawing/2014/main" id="{1D68ED91-A5B1-47B2-93BF-9A7136A89BCD}"/>
+                  <a16:creationId xmlns="" xmlns:a16="http://schemas.microsoft.com/office/drawing/2014/main" id="{1D68ED91-A5B1-47B2-93BF-9A7136A89BCD}"/>
                 </a:ext>
                 <a:ext uri="{C183D7F6-B498-43B3-948B-1728B52AA6E4}">
-                  <adec:decorative xmlns:adec="http://schemas.microsoft.com/office/drawing/2017/decorative" val="1"/>
+                  <adec:decorative xmlns="" xmlns:adec="http://schemas.microsoft.com/office/drawing/2017/decorative" val="1"/>
                 </a:ext>
               </a:extLst>
             </p:cNvPr>
@@ -9417,7 +9799,7 @@
             <p:nvPr>
               <p:extLst>
                 <p:ext uri="{386F3935-93C4-4BCD-93E2-E3B085C9AB24}">
-                  <p16:designElem xmlns:p16="http://schemas.microsoft.com/office/powerpoint/2015/main" val="1"/>
+                  <p16:designElem xmlns="" xmlns:p16="http://schemas.microsoft.com/office/powerpoint/2015/main" val="1"/>
                 </p:ext>
               </p:extLst>
             </p:nvPr>
@@ -9483,10 +9865,10 @@
             <p:cNvPr id="16" name="Oval 15">
               <a:extLst>
                 <a:ext uri="{FF2B5EF4-FFF2-40B4-BE49-F238E27FC236}">
-                  <a16:creationId xmlns:a16="http://schemas.microsoft.com/office/drawing/2014/main" id="{BE7D0AA1-7663-4AEB-906F-8C1983487487}"/>
+                  <a16:creationId xmlns="" xmlns:a16="http://schemas.microsoft.com/office/drawing/2014/main" id="{BE7D0AA1-7663-4AEB-906F-8C1983487487}"/>
                 </a:ext>
                 <a:ext uri="{C183D7F6-B498-43B3-948B-1728B52AA6E4}">
-                  <adec:decorative xmlns:adec="http://schemas.microsoft.com/office/drawing/2017/decorative" val="1"/>
+                  <adec:decorative xmlns="" xmlns:adec="http://schemas.microsoft.com/office/drawing/2017/decorative" val="1"/>
                 </a:ext>
               </a:extLst>
             </p:cNvPr>
@@ -9494,7 +9876,7 @@
             <p:nvPr>
               <p:extLst>
                 <p:ext uri="{386F3935-93C4-4BCD-93E2-E3B085C9AB24}">
-                  <p16:designElem xmlns:p16="http://schemas.microsoft.com/office/powerpoint/2015/main" val="1"/>
+                  <p16:designElem xmlns="" xmlns:p16="http://schemas.microsoft.com/office/powerpoint/2015/main" val="1"/>
                 </p:ext>
               </p:extLst>
             </p:nvPr>
@@ -9558,10 +9940,10 @@
             <p:cNvPr id="17" name="Oval 16">
               <a:extLst>
                 <a:ext uri="{FF2B5EF4-FFF2-40B4-BE49-F238E27FC236}">
-                  <a16:creationId xmlns:a16="http://schemas.microsoft.com/office/drawing/2014/main" id="{FD0B5082-766B-4B9B-95AE-8345369B680F}"/>
+                  <a16:creationId xmlns="" xmlns:a16="http://schemas.microsoft.com/office/drawing/2014/main" id="{FD0B5082-766B-4B9B-95AE-8345369B680F}"/>
                 </a:ext>
                 <a:ext uri="{C183D7F6-B498-43B3-948B-1728B52AA6E4}">
-                  <adec:decorative xmlns:adec="http://schemas.microsoft.com/office/drawing/2017/decorative" val="1"/>
+                  <adec:decorative xmlns="" xmlns:adec="http://schemas.microsoft.com/office/drawing/2017/decorative" val="1"/>
                 </a:ext>
               </a:extLst>
             </p:cNvPr>
@@ -9569,7 +9951,7 @@
             <p:nvPr>
               <p:extLst>
                 <p:ext uri="{386F3935-93C4-4BCD-93E2-E3B085C9AB24}">
-                  <p16:designElem xmlns:p16="http://schemas.microsoft.com/office/powerpoint/2015/main" val="1"/>
+                  <p16:designElem xmlns="" xmlns:p16="http://schemas.microsoft.com/office/powerpoint/2015/main" val="1"/>
                 </p:ext>
               </p:extLst>
             </p:nvPr>
@@ -9633,10 +10015,10 @@
             <p:cNvPr id="18" name="Oval 17">
               <a:extLst>
                 <a:ext uri="{FF2B5EF4-FFF2-40B4-BE49-F238E27FC236}">
-                  <a16:creationId xmlns:a16="http://schemas.microsoft.com/office/drawing/2014/main" id="{C6EA71F2-5221-4164-8741-7AFF97E22146}"/>
+                  <a16:creationId xmlns="" xmlns:a16="http://schemas.microsoft.com/office/drawing/2014/main" id="{C6EA71F2-5221-4164-8741-7AFF97E22146}"/>
                 </a:ext>
                 <a:ext uri="{C183D7F6-B498-43B3-948B-1728B52AA6E4}">
-                  <adec:decorative xmlns:adec="http://schemas.microsoft.com/office/drawing/2017/decorative" val="1"/>
+                  <adec:decorative xmlns="" xmlns:adec="http://schemas.microsoft.com/office/drawing/2017/decorative" val="1"/>
                 </a:ext>
               </a:extLst>
             </p:cNvPr>
@@ -9644,7 +10026,7 @@
             <p:nvPr>
               <p:extLst>
                 <p:ext uri="{386F3935-93C4-4BCD-93E2-E3B085C9AB24}">
-                  <p16:designElem xmlns:p16="http://schemas.microsoft.com/office/powerpoint/2015/main" val="1"/>
+                  <p16:designElem xmlns="" xmlns:p16="http://schemas.microsoft.com/office/powerpoint/2015/main" val="1"/>
                 </p:ext>
               </p:extLst>
             </p:nvPr>
@@ -9710,10 +10092,10 @@
             <p:cNvPr id="19" name="Oval 18">
               <a:extLst>
                 <a:ext uri="{FF2B5EF4-FFF2-40B4-BE49-F238E27FC236}">
-                  <a16:creationId xmlns:a16="http://schemas.microsoft.com/office/drawing/2014/main" id="{A53567A6-853B-47EF-8846-22A1C04687FE}"/>
+                  <a16:creationId xmlns="" xmlns:a16="http://schemas.microsoft.com/office/drawing/2014/main" id="{A53567A6-853B-47EF-8846-22A1C04687FE}"/>
                 </a:ext>
                 <a:ext uri="{C183D7F6-B498-43B3-948B-1728B52AA6E4}">
-                  <adec:decorative xmlns:adec="http://schemas.microsoft.com/office/drawing/2017/decorative" val="1"/>
+                  <adec:decorative xmlns="" xmlns:adec="http://schemas.microsoft.com/office/drawing/2017/decorative" val="1"/>
                 </a:ext>
               </a:extLst>
             </p:cNvPr>
@@ -9721,7 +10103,7 @@
             <p:nvPr>
               <p:extLst>
                 <p:ext uri="{386F3935-93C4-4BCD-93E2-E3B085C9AB24}">
-                  <p16:designElem xmlns:p16="http://schemas.microsoft.com/office/powerpoint/2015/main" val="1"/>
+                  <p16:designElem xmlns="" xmlns:p16="http://schemas.microsoft.com/office/powerpoint/2015/main" val="1"/>
                 </p:ext>
               </p:extLst>
             </p:nvPr>
@@ -9787,10 +10169,10 @@
           <p:cNvPr id="21" name="Rectangle 20">
             <a:extLst>
               <a:ext uri="{FF2B5EF4-FFF2-40B4-BE49-F238E27FC236}">
-                <a16:creationId xmlns:a16="http://schemas.microsoft.com/office/drawing/2014/main" id="{57957B04-C024-4B5F-B7C3-20FAE3F1D3CA}"/>
+                <a16:creationId xmlns="" xmlns:a16="http://schemas.microsoft.com/office/drawing/2014/main" id="{57957B04-C024-4B5F-B7C3-20FAE3F1D3CA}"/>
               </a:ext>
               <a:ext uri="{C183D7F6-B498-43B3-948B-1728B52AA6E4}">
-                <adec:decorative xmlns:adec="http://schemas.microsoft.com/office/drawing/2017/decorative" val="1"/>
+                <adec:decorative xmlns="" xmlns:adec="http://schemas.microsoft.com/office/drawing/2017/decorative" val="1"/>
               </a:ext>
             </a:extLst>
           </p:cNvPr>
@@ -9800,7 +10182,7 @@
           <p:nvPr>
             <p:extLst>
               <p:ext uri="{386F3935-93C4-4BCD-93E2-E3B085C9AB24}">
-                <p16:designElem xmlns:p16="http://schemas.microsoft.com/office/powerpoint/2015/main" val="1"/>
+                <p16:designElem xmlns="" xmlns:p16="http://schemas.microsoft.com/office/powerpoint/2015/main" val="1"/>
               </p:ext>
             </p:extLst>
           </p:nvPr>
@@ -9866,10 +10248,10 @@
           <p:cNvPr id="23" name="Rectangle 22">
             <a:extLst>
               <a:ext uri="{FF2B5EF4-FFF2-40B4-BE49-F238E27FC236}">
-                <a16:creationId xmlns:a16="http://schemas.microsoft.com/office/drawing/2014/main" id="{C6FBFCE4-B693-49EB-9CE1-4420332195E7}"/>
+                <a16:creationId xmlns="" xmlns:a16="http://schemas.microsoft.com/office/drawing/2014/main" id="{C6FBFCE4-B693-49EB-9CE1-4420332195E7}"/>
               </a:ext>
               <a:ext uri="{C183D7F6-B498-43B3-948B-1728B52AA6E4}">
-                <adec:decorative xmlns:adec="http://schemas.microsoft.com/office/drawing/2017/decorative" val="1"/>
+                <adec:decorative xmlns="" xmlns:adec="http://schemas.microsoft.com/office/drawing/2017/decorative" val="1"/>
               </a:ext>
             </a:extLst>
           </p:cNvPr>
@@ -9879,7 +10261,7 @@
           <p:nvPr>
             <p:extLst>
               <p:ext uri="{386F3935-93C4-4BCD-93E2-E3B085C9AB24}">
-                <p16:designElem xmlns:p16="http://schemas.microsoft.com/office/powerpoint/2015/main" val="1"/>
+                <p16:designElem xmlns="" xmlns:p16="http://schemas.microsoft.com/office/powerpoint/2015/main" val="1"/>
               </p:ext>
             </p:extLst>
           </p:nvPr>
@@ -9945,10 +10327,10 @@
           <p:cNvPr id="25" name="Group 24">
             <a:extLst>
               <a:ext uri="{FF2B5EF4-FFF2-40B4-BE49-F238E27FC236}">
-                <a16:creationId xmlns:a16="http://schemas.microsoft.com/office/drawing/2014/main" id="{8FFC4225-9683-4D55-8686-FCDDB8BCBF38}"/>
+                <a16:creationId xmlns="" xmlns:a16="http://schemas.microsoft.com/office/drawing/2014/main" id="{8FFC4225-9683-4D55-8686-FCDDB8BCBF38}"/>
               </a:ext>
               <a:ext uri="{C183D7F6-B498-43B3-948B-1728B52AA6E4}">
-                <adec:decorative xmlns:adec="http://schemas.microsoft.com/office/drawing/2017/decorative" val="1"/>
+                <adec:decorative xmlns="" xmlns:adec="http://schemas.microsoft.com/office/drawing/2017/decorative" val="1"/>
               </a:ext>
             </a:extLst>
           </p:cNvPr>
@@ -9958,7 +10340,7 @@
           <p:nvPr>
             <p:extLst>
               <p:ext uri="{386F3935-93C4-4BCD-93E2-E3B085C9AB24}">
-                <p16:designElem xmlns:p16="http://schemas.microsoft.com/office/powerpoint/2015/main" val="1"/>
+                <p16:designElem xmlns="" xmlns:p16="http://schemas.microsoft.com/office/powerpoint/2015/main" val="1"/>
               </p:ext>
             </p:extLst>
           </p:nvPr>
@@ -9976,10 +10358,10 @@
             <p:cNvPr id="26" name="Straight Connector 25">
               <a:extLst>
                 <a:ext uri="{FF2B5EF4-FFF2-40B4-BE49-F238E27FC236}">
-                  <a16:creationId xmlns:a16="http://schemas.microsoft.com/office/drawing/2014/main" id="{23CC42CD-CAE0-4CF0-B118-067FD44AE1EA}"/>
+                  <a16:creationId xmlns="" xmlns:a16="http://schemas.microsoft.com/office/drawing/2014/main" id="{23CC42CD-CAE0-4CF0-B118-067FD44AE1EA}"/>
                 </a:ext>
                 <a:ext uri="{C183D7F6-B498-43B3-948B-1728B52AA6E4}">
-                  <adec:decorative xmlns:adec="http://schemas.microsoft.com/office/drawing/2017/decorative" val="1"/>
+                  <adec:decorative xmlns="" xmlns:adec="http://schemas.microsoft.com/office/drawing/2017/decorative" val="1"/>
                 </a:ext>
               </a:extLst>
             </p:cNvPr>
@@ -9989,7 +10371,7 @@
             <p:nvPr>
               <p:extLst>
                 <p:ext uri="{386F3935-93C4-4BCD-93E2-E3B085C9AB24}">
-                  <p16:designElem xmlns:p16="http://schemas.microsoft.com/office/powerpoint/2015/main" val="1"/>
+                  <p16:designElem xmlns="" xmlns:p16="http://schemas.microsoft.com/office/powerpoint/2015/main" val="1"/>
                 </p:ext>
               </p:extLst>
             </p:nvPr>
@@ -10045,10 +10427,10 @@
             <p:cNvPr id="27" name="Straight Connector 26">
               <a:extLst>
                 <a:ext uri="{FF2B5EF4-FFF2-40B4-BE49-F238E27FC236}">
-                  <a16:creationId xmlns:a16="http://schemas.microsoft.com/office/drawing/2014/main" id="{C53ED46F-B155-4F61-89A2-9811AA0F3B4E}"/>
+                  <a16:creationId xmlns="" xmlns:a16="http://schemas.microsoft.com/office/drawing/2014/main" id="{C53ED46F-B155-4F61-89A2-9811AA0F3B4E}"/>
                 </a:ext>
                 <a:ext uri="{C183D7F6-B498-43B3-948B-1728B52AA6E4}">
-                  <adec:decorative xmlns:adec="http://schemas.microsoft.com/office/drawing/2017/decorative" val="1"/>
+                  <adec:decorative xmlns="" xmlns:adec="http://schemas.microsoft.com/office/drawing/2017/decorative" val="1"/>
                 </a:ext>
               </a:extLst>
             </p:cNvPr>
@@ -10058,7 +10440,7 @@
             <p:nvPr>
               <p:extLst>
                 <p:ext uri="{386F3935-93C4-4BCD-93E2-E3B085C9AB24}">
-                  <p16:designElem xmlns:p16="http://schemas.microsoft.com/office/powerpoint/2015/main" val="1"/>
+                  <p16:designElem xmlns="" xmlns:p16="http://schemas.microsoft.com/office/powerpoint/2015/main" val="1"/>
                 </p:ext>
               </p:extLst>
             </p:nvPr>
@@ -10114,10 +10496,10 @@
             <p:cNvPr id="28" name="Straight Connector 27">
               <a:extLst>
                 <a:ext uri="{FF2B5EF4-FFF2-40B4-BE49-F238E27FC236}">
-                  <a16:creationId xmlns:a16="http://schemas.microsoft.com/office/drawing/2014/main" id="{083B7973-20C3-4DB8-B3E0-064793F7A9AC}"/>
+                  <a16:creationId xmlns="" xmlns:a16="http://schemas.microsoft.com/office/drawing/2014/main" id="{083B7973-20C3-4DB8-B3E0-064793F7A9AC}"/>
                 </a:ext>
                 <a:ext uri="{C183D7F6-B498-43B3-948B-1728B52AA6E4}">
-                  <adec:decorative xmlns:adec="http://schemas.microsoft.com/office/drawing/2017/decorative" val="1"/>
+                  <adec:decorative xmlns="" xmlns:adec="http://schemas.microsoft.com/office/drawing/2017/decorative" val="1"/>
                 </a:ext>
               </a:extLst>
             </p:cNvPr>
@@ -10127,7 +10509,7 @@
             <p:nvPr>
               <p:extLst>
                 <p:ext uri="{386F3935-93C4-4BCD-93E2-E3B085C9AB24}">
-                  <p16:designElem xmlns:p16="http://schemas.microsoft.com/office/powerpoint/2015/main" val="1"/>
+                  <p16:designElem xmlns="" xmlns:p16="http://schemas.microsoft.com/office/powerpoint/2015/main" val="1"/>
                 </p:ext>
               </p:extLst>
             </p:nvPr>
@@ -10183,10 +10565,10 @@
             <p:cNvPr id="29" name="Straight Connector 28">
               <a:extLst>
                 <a:ext uri="{FF2B5EF4-FFF2-40B4-BE49-F238E27FC236}">
-                  <a16:creationId xmlns:a16="http://schemas.microsoft.com/office/drawing/2014/main" id="{DF30D744-3746-48BB-92A0-20B891DE8683}"/>
+                  <a16:creationId xmlns="" xmlns:a16="http://schemas.microsoft.com/office/drawing/2014/main" id="{DF30D744-3746-48BB-92A0-20B891DE8683}"/>
                 </a:ext>
                 <a:ext uri="{C183D7F6-B498-43B3-948B-1728B52AA6E4}">
-                  <adec:decorative xmlns:adec="http://schemas.microsoft.com/office/drawing/2017/decorative" val="1"/>
+                  <adec:decorative xmlns="" xmlns:adec="http://schemas.microsoft.com/office/drawing/2017/decorative" val="1"/>
                 </a:ext>
               </a:extLst>
             </p:cNvPr>
@@ -10196,7 +10578,7 @@
             <p:nvPr>
               <p:extLst>
                 <p:ext uri="{386F3935-93C4-4BCD-93E2-E3B085C9AB24}">
-                  <p16:designElem xmlns:p16="http://schemas.microsoft.com/office/powerpoint/2015/main" val="1"/>
+                  <p16:designElem xmlns="" xmlns:p16="http://schemas.microsoft.com/office/powerpoint/2015/main" val="1"/>
                 </p:ext>
               </p:extLst>
             </p:nvPr>
@@ -10253,10 +10635,10 @@
           <p:cNvPr id="31" name="Group 30">
             <a:extLst>
               <a:ext uri="{FF2B5EF4-FFF2-40B4-BE49-F238E27FC236}">
-                <a16:creationId xmlns:a16="http://schemas.microsoft.com/office/drawing/2014/main" id="{2993EE7D-6C2F-43A3-9C60-0C79DB9E529F}"/>
+                <a16:creationId xmlns="" xmlns:a16="http://schemas.microsoft.com/office/drawing/2014/main" id="{2993EE7D-6C2F-43A3-9C60-0C79DB9E529F}"/>
               </a:ext>
               <a:ext uri="{C183D7F6-B498-43B3-948B-1728B52AA6E4}">
-                <adec:decorative xmlns:adec="http://schemas.microsoft.com/office/drawing/2017/decorative" val="1"/>
+                <adec:decorative xmlns="" xmlns:adec="http://schemas.microsoft.com/office/drawing/2017/decorative" val="1"/>
               </a:ext>
             </a:extLst>
           </p:cNvPr>
@@ -10266,7 +10648,7 @@
           <p:nvPr>
             <p:extLst>
               <p:ext uri="{386F3935-93C4-4BCD-93E2-E3B085C9AB24}">
-                <p16:designElem xmlns:p16="http://schemas.microsoft.com/office/powerpoint/2015/main" val="1"/>
+                <p16:designElem xmlns="" xmlns:p16="http://schemas.microsoft.com/office/powerpoint/2015/main" val="1"/>
               </p:ext>
             </p:extLst>
           </p:nvPr>
@@ -10284,10 +10666,10 @@
             <p:cNvPr id="32" name="Straight Connector 31">
               <a:extLst>
                 <a:ext uri="{FF2B5EF4-FFF2-40B4-BE49-F238E27FC236}">
-                  <a16:creationId xmlns:a16="http://schemas.microsoft.com/office/drawing/2014/main" id="{4F4095D5-6DE8-4CF4-8418-1C6822E16482}"/>
+                  <a16:creationId xmlns="" xmlns:a16="http://schemas.microsoft.com/office/drawing/2014/main" id="{4F4095D5-6DE8-4CF4-8418-1C6822E16482}"/>
                 </a:ext>
                 <a:ext uri="{C183D7F6-B498-43B3-948B-1728B52AA6E4}">
-                  <adec:decorative xmlns:adec="http://schemas.microsoft.com/office/drawing/2017/decorative" val="1"/>
+                  <adec:decorative xmlns="" xmlns:adec="http://schemas.microsoft.com/office/drawing/2017/decorative" val="1"/>
                 </a:ext>
               </a:extLst>
             </p:cNvPr>
@@ -10297,7 +10679,7 @@
             <p:nvPr>
               <p:extLst>
                 <p:ext uri="{386F3935-93C4-4BCD-93E2-E3B085C9AB24}">
-                  <p16:designElem xmlns:p16="http://schemas.microsoft.com/office/powerpoint/2015/main" val="1"/>
+                  <p16:designElem xmlns="" xmlns:p16="http://schemas.microsoft.com/office/powerpoint/2015/main" val="1"/>
                 </p:ext>
               </p:extLst>
             </p:nvPr>
@@ -10341,10 +10723,10 @@
             <p:cNvPr id="33" name="Straight Connector 32">
               <a:extLst>
                 <a:ext uri="{FF2B5EF4-FFF2-40B4-BE49-F238E27FC236}">
-                  <a16:creationId xmlns:a16="http://schemas.microsoft.com/office/drawing/2014/main" id="{33CD50F6-3A5C-4547-BD23-ACBD8E3913DE}"/>
+                  <a16:creationId xmlns="" xmlns:a16="http://schemas.microsoft.com/office/drawing/2014/main" id="{33CD50F6-3A5C-4547-BD23-ACBD8E3913DE}"/>
                 </a:ext>
                 <a:ext uri="{C183D7F6-B498-43B3-948B-1728B52AA6E4}">
-                  <adec:decorative xmlns:adec="http://schemas.microsoft.com/office/drawing/2017/decorative" val="1"/>
+                  <adec:decorative xmlns="" xmlns:adec="http://schemas.microsoft.com/office/drawing/2017/decorative" val="1"/>
                 </a:ext>
               </a:extLst>
             </p:cNvPr>
@@ -10354,7 +10736,7 @@
             <p:nvPr>
               <p:extLst>
                 <p:ext uri="{386F3935-93C4-4BCD-93E2-E3B085C9AB24}">
-                  <p16:designElem xmlns:p16="http://schemas.microsoft.com/office/powerpoint/2015/main" val="1"/>
+                  <p16:designElem xmlns="" xmlns:p16="http://schemas.microsoft.com/office/powerpoint/2015/main" val="1"/>
                 </p:ext>
               </p:extLst>
             </p:nvPr>
@@ -10398,10 +10780,10 @@
             <p:cNvPr id="34" name="Straight Connector 33">
               <a:extLst>
                 <a:ext uri="{FF2B5EF4-FFF2-40B4-BE49-F238E27FC236}">
-                  <a16:creationId xmlns:a16="http://schemas.microsoft.com/office/drawing/2014/main" id="{6912E168-78F1-4E05-A8A5-65F2BAF5969C}"/>
+                  <a16:creationId xmlns="" xmlns:a16="http://schemas.microsoft.com/office/drawing/2014/main" id="{6912E168-78F1-4E05-A8A5-65F2BAF5969C}"/>
                 </a:ext>
                 <a:ext uri="{C183D7F6-B498-43B3-948B-1728B52AA6E4}">
-                  <adec:decorative xmlns:adec="http://schemas.microsoft.com/office/drawing/2017/decorative" val="1"/>
+                  <adec:decorative xmlns="" xmlns:adec="http://schemas.microsoft.com/office/drawing/2017/decorative" val="1"/>
                 </a:ext>
               </a:extLst>
             </p:cNvPr>
@@ -10411,7 +10793,7 @@
             <p:nvPr>
               <p:extLst>
                 <p:ext uri="{386F3935-93C4-4BCD-93E2-E3B085C9AB24}">
-                  <p16:designElem xmlns:p16="http://schemas.microsoft.com/office/powerpoint/2015/main" val="1"/>
+                  <p16:designElem xmlns="" xmlns:p16="http://schemas.microsoft.com/office/powerpoint/2015/main" val="1"/>
                 </p:ext>
               </p:extLst>
             </p:nvPr>
@@ -10455,10 +10837,10 @@
             <p:cNvPr id="35" name="Straight Connector 34">
               <a:extLst>
                 <a:ext uri="{FF2B5EF4-FFF2-40B4-BE49-F238E27FC236}">
-                  <a16:creationId xmlns:a16="http://schemas.microsoft.com/office/drawing/2014/main" id="{7315E977-7B29-4DD8-9B9E-C63D97DF3072}"/>
+                  <a16:creationId xmlns="" xmlns:a16="http://schemas.microsoft.com/office/drawing/2014/main" id="{7315E977-7B29-4DD8-9B9E-C63D97DF3072}"/>
                 </a:ext>
                 <a:ext uri="{C183D7F6-B498-43B3-948B-1728B52AA6E4}">
-                  <adec:decorative xmlns:adec="http://schemas.microsoft.com/office/drawing/2017/decorative" val="1"/>
+                  <adec:decorative xmlns="" xmlns:adec="http://schemas.microsoft.com/office/drawing/2017/decorative" val="1"/>
                 </a:ext>
               </a:extLst>
             </p:cNvPr>
@@ -10468,7 +10850,7 @@
             <p:nvPr>
               <p:extLst>
                 <p:ext uri="{386F3935-93C4-4BCD-93E2-E3B085C9AB24}">
-                  <p16:designElem xmlns:p16="http://schemas.microsoft.com/office/powerpoint/2015/main" val="1"/>
+                  <p16:designElem xmlns="" xmlns:p16="http://schemas.microsoft.com/office/powerpoint/2015/main" val="1"/>
                 </p:ext>
               </p:extLst>
             </p:nvPr>
@@ -10513,7 +10895,7 @@
           <p:cNvPr id="8" name="Imagem 9" descr="Texto branco sobre fundo preto&#10;&#10;Descrição gerada com alta confiança">
             <a:extLst>
               <a:ext uri="{FF2B5EF4-FFF2-40B4-BE49-F238E27FC236}">
-                <a16:creationId xmlns:a16="http://schemas.microsoft.com/office/drawing/2014/main" id="{2AD1B23F-1617-401A-B114-1038FAB41F59}"/>
+                <a16:creationId xmlns="" xmlns:a16="http://schemas.microsoft.com/office/drawing/2014/main" id="{2AD1B23F-1617-401A-B114-1038FAB41F59}"/>
               </a:ext>
             </a:extLst>
           </p:cNvPr>
@@ -10547,6 +10929,13 @@
   <p:clrMapOvr>
     <a:masterClrMapping/>
   </p:clrMapOvr>
+  <p:timing>
+    <p:tnLst>
+      <p:par>
+        <p:cTn id="1" dur="indefinite" restart="never" nodeType="tmRoot"/>
+      </p:par>
+    </p:tnLst>
+  </p:timing>
 </p:sld>
 </file>
 
@@ -10580,10 +10969,10 @@
           <p:cNvPr id="6" name="Rectangle 8">
             <a:extLst>
               <a:ext uri="{FF2B5EF4-FFF2-40B4-BE49-F238E27FC236}">
-                <a16:creationId xmlns:a16="http://schemas.microsoft.com/office/drawing/2014/main" id="{B082622D-AAF3-4897-8629-FC918530DD86}"/>
+                <a16:creationId xmlns="" xmlns:a16="http://schemas.microsoft.com/office/drawing/2014/main" id="{B082622D-AAF3-4897-8629-FC918530DD86}"/>
               </a:ext>
               <a:ext uri="{C183D7F6-B498-43B3-948B-1728B52AA6E4}">
-                <adec:decorative xmlns:adec="http://schemas.microsoft.com/office/drawing/2017/decorative" val="1"/>
+                <adec:decorative xmlns="" xmlns:adec="http://schemas.microsoft.com/office/drawing/2017/decorative" val="1"/>
               </a:ext>
             </a:extLst>
           </p:cNvPr>
@@ -10593,7 +10982,7 @@
           <p:nvPr>
             <p:extLst>
               <p:ext uri="{386F3935-93C4-4BCD-93E2-E3B085C9AB24}">
-                <p16:designElem xmlns:p16="http://schemas.microsoft.com/office/powerpoint/2015/main" val="1"/>
+                <p16:designElem xmlns="" xmlns:p16="http://schemas.microsoft.com/office/powerpoint/2015/main" val="1"/>
               </p:ext>
             </p:extLst>
           </p:nvPr>
@@ -10640,10 +11029,10 @@
           <p:cNvPr id="11" name="Rectangle 10">
             <a:extLst>
               <a:ext uri="{FF2B5EF4-FFF2-40B4-BE49-F238E27FC236}">
-                <a16:creationId xmlns:a16="http://schemas.microsoft.com/office/drawing/2014/main" id="{A7457DD9-5A45-400A-AB4B-4B4EDECA25F1}"/>
+                <a16:creationId xmlns="" xmlns:a16="http://schemas.microsoft.com/office/drawing/2014/main" id="{A7457DD9-5A45-400A-AB4B-4B4EDECA25F1}"/>
               </a:ext>
               <a:ext uri="{C183D7F6-B498-43B3-948B-1728B52AA6E4}">
-                <adec:decorative xmlns:adec="http://schemas.microsoft.com/office/drawing/2017/decorative" val="1"/>
+                <adec:decorative xmlns="" xmlns:adec="http://schemas.microsoft.com/office/drawing/2017/decorative" val="1"/>
               </a:ext>
             </a:extLst>
           </p:cNvPr>
@@ -10653,7 +11042,7 @@
           <p:nvPr>
             <p:extLst>
               <p:ext uri="{386F3935-93C4-4BCD-93E2-E3B085C9AB24}">
-                <p16:designElem xmlns:p16="http://schemas.microsoft.com/office/powerpoint/2015/main" val="1"/>
+                <p16:designElem xmlns="" xmlns:p16="http://schemas.microsoft.com/office/powerpoint/2015/main" val="1"/>
               </p:ext>
             </p:extLst>
           </p:nvPr>
@@ -10739,7 +11128,7 @@
           <p:cNvPr id="2" name="Título 1">
             <a:extLst>
               <a:ext uri="{FF2B5EF4-FFF2-40B4-BE49-F238E27FC236}">
-                <a16:creationId xmlns:a16="http://schemas.microsoft.com/office/drawing/2014/main" id="{8A071D30-AABF-4423-8BB1-8A9ED54AA604}"/>
+                <a16:creationId xmlns="" xmlns:a16="http://schemas.microsoft.com/office/drawing/2014/main" id="{8A071D30-AABF-4423-8BB1-8A9ED54AA604}"/>
               </a:ext>
             </a:extLst>
           </p:cNvPr>
@@ -10766,7 +11155,25 @@
               <a:rPr lang="pt-BR" sz="2800" dirty="0">
                 <a:cs typeface="Calibri"/>
               </a:rPr>
-              <a:t>Link do repositório remoto</a:t>
+              <a:t>Link do repositório </a:t>
+            </a:r>
+            <a:r>
+              <a:rPr lang="pt-BR" sz="2800" dirty="0" smtClean="0">
+                <a:cs typeface="Calibri"/>
+              </a:rPr>
+              <a:t>remoto(</a:t>
+            </a:r>
+            <a:r>
+              <a:rPr lang="pt-BR" sz="2800" dirty="0" err="1" smtClean="0">
+                <a:cs typeface="Calibri"/>
+              </a:rPr>
+              <a:t>GitHub</a:t>
+            </a:r>
+            <a:r>
+              <a:rPr lang="pt-BR" sz="2800" dirty="0" smtClean="0">
+                <a:cs typeface="Calibri"/>
+              </a:rPr>
+              <a:t>)</a:t>
             </a:r>
             <a:endParaRPr lang="pt-BR" sz="2800" dirty="0"/>
           </a:p>
@@ -10777,10 +11184,10 @@
           <p:cNvPr id="13" name="Rectangle 12">
             <a:extLst>
               <a:ext uri="{FF2B5EF4-FFF2-40B4-BE49-F238E27FC236}">
-                <a16:creationId xmlns:a16="http://schemas.microsoft.com/office/drawing/2014/main" id="{441CF7D6-A660-431A-B0BB-140A0D5556B6}"/>
+                <a16:creationId xmlns="" xmlns:a16="http://schemas.microsoft.com/office/drawing/2014/main" id="{441CF7D6-A660-431A-B0BB-140A0D5556B6}"/>
               </a:ext>
               <a:ext uri="{C183D7F6-B498-43B3-948B-1728B52AA6E4}">
-                <adec:decorative xmlns:adec="http://schemas.microsoft.com/office/drawing/2017/decorative" val="1"/>
+                <adec:decorative xmlns="" xmlns:adec="http://schemas.microsoft.com/office/drawing/2017/decorative" val="1"/>
               </a:ext>
             </a:extLst>
           </p:cNvPr>
@@ -10790,7 +11197,7 @@
           <p:nvPr>
             <p:extLst>
               <p:ext uri="{386F3935-93C4-4BCD-93E2-E3B085C9AB24}">
-                <p16:designElem xmlns:p16="http://schemas.microsoft.com/office/powerpoint/2015/main" val="1"/>
+                <p16:designElem xmlns="" xmlns:p16="http://schemas.microsoft.com/office/powerpoint/2015/main" val="1"/>
               </p:ext>
             </p:extLst>
           </p:nvPr>
@@ -10845,10 +11252,10 @@
           <p:cNvPr id="15" name="Rectangle 14">
             <a:extLst>
               <a:ext uri="{FF2B5EF4-FFF2-40B4-BE49-F238E27FC236}">
-                <a16:creationId xmlns:a16="http://schemas.microsoft.com/office/drawing/2014/main" id="{0570A85B-3810-4F95-97B0-CBF4CCDB381C}"/>
+                <a16:creationId xmlns="" xmlns:a16="http://schemas.microsoft.com/office/drawing/2014/main" id="{0570A85B-3810-4F95-97B0-CBF4CCDB381C}"/>
               </a:ext>
               <a:ext uri="{C183D7F6-B498-43B3-948B-1728B52AA6E4}">
-                <adec:decorative xmlns:adec="http://schemas.microsoft.com/office/drawing/2017/decorative" val="1"/>
+                <adec:decorative xmlns="" xmlns:adec="http://schemas.microsoft.com/office/drawing/2017/decorative" val="1"/>
               </a:ext>
             </a:extLst>
           </p:cNvPr>
@@ -10858,7 +11265,7 @@
           <p:nvPr>
             <p:extLst>
               <p:ext uri="{386F3935-93C4-4BCD-93E2-E3B085C9AB24}">
-                <p16:designElem xmlns:p16="http://schemas.microsoft.com/office/powerpoint/2015/main" val="1"/>
+                <p16:designElem xmlns="" xmlns:p16="http://schemas.microsoft.com/office/powerpoint/2015/main" val="1"/>
               </p:ext>
             </p:extLst>
           </p:nvPr>
@@ -10938,7 +11345,7 @@
           <p:cNvPr id="3" name="Espaço Reservado para Conteúdo 2">
             <a:extLst>
               <a:ext uri="{FF2B5EF4-FFF2-40B4-BE49-F238E27FC236}">
-                <a16:creationId xmlns:a16="http://schemas.microsoft.com/office/drawing/2014/main" id="{E988EEB2-14A3-4C2D-BC3C-CE921EDB5224}"/>
+                <a16:creationId xmlns="" xmlns:a16="http://schemas.microsoft.com/office/drawing/2014/main" id="{E988EEB2-14A3-4C2D-BC3C-CE921EDB5224}"/>
               </a:ext>
             </a:extLst>
           </p:cNvPr>
@@ -10975,7 +11382,7 @@
             <a:pPr marL="0" indent="0">
               <a:buNone/>
             </a:pPr>
-            <a:endParaRPr lang="pt-BR" sz="1600">
+            <a:endParaRPr lang="pt-BR" sz="1600" dirty="0">
               <a:cs typeface="Calibri"/>
             </a:endParaRPr>
           </a:p>
@@ -10986,7 +11393,7 @@
           <p:cNvPr id="4" name="Imagem 4" descr="Tela de celular com publicação numa rede social&#10;&#10;Descrição gerada com alta confiança">
             <a:extLst>
               <a:ext uri="{FF2B5EF4-FFF2-40B4-BE49-F238E27FC236}">
-                <a16:creationId xmlns:a16="http://schemas.microsoft.com/office/drawing/2014/main" id="{AA3D0964-DDC6-4203-A4D1-EF9DE69330E3}"/>
+                <a16:creationId xmlns="" xmlns:a16="http://schemas.microsoft.com/office/drawing/2014/main" id="{AA3D0964-DDC6-4203-A4D1-EF9DE69330E3}"/>
               </a:ext>
             </a:extLst>
           </p:cNvPr>
@@ -11020,6 +11427,13 @@
   <p:clrMapOvr>
     <a:masterClrMapping/>
   </p:clrMapOvr>
+  <p:timing>
+    <p:tnLst>
+      <p:par>
+        <p:cTn id="1" dur="indefinite" restart="never" nodeType="tmRoot"/>
+      </p:par>
+    </p:tnLst>
+  </p:timing>
 </p:sld>
 </file>
 

</xml_diff>